<commit_message>
upload papers for I/O
</commit_message>
<xml_diff>
--- a/Papers/ML Apply in OS/updates.pptx
+++ b/Papers/ML Apply in OS/updates.pptx
@@ -4,9 +4,13 @@
   <p:sldMasterIdLst>
     <p:sldMasterId id="2147483648" r:id="rId1"/>
   </p:sldMasterIdLst>
+  <p:notesMasterIdLst>
+    <p:notesMasterId r:id="rId5"/>
+  </p:notesMasterIdLst>
   <p:sldIdLst>
     <p:sldId id="257" r:id="rId2"/>
-    <p:sldId id="258" r:id="rId3"/>
+    <p:sldId id="259" r:id="rId3"/>
+    <p:sldId id="260" r:id="rId4"/>
   </p:sldIdLst>
   <p:sldSz cx="12192000" cy="6858000"/>
   <p:notesSz cx="6858000" cy="9144000"/>
@@ -105,7 +109,641 @@
       </a:defRPr>
     </a:lvl9pPr>
   </p:defaultTextStyle>
+  <p:extLst>
+    <p:ext uri="{EFAFB233-063F-42B5-8137-9DF3F51BA10A}">
+      <p15:sldGuideLst xmlns:p15="http://schemas.microsoft.com/office/powerpoint/2012/main"/>
+    </p:ext>
+  </p:extLst>
 </p:presentation>
+</file>
+
+<file path=ppt/notesMasters/notesMaster1.xml><?xml version="1.0" encoding="utf-8"?>
+<p:notesMaster xmlns:a="http://schemas.openxmlformats.org/drawingml/2006/main" xmlns:r="http://schemas.openxmlformats.org/officeDocument/2006/relationships" xmlns:p="http://schemas.openxmlformats.org/presentationml/2006/main">
+  <p:cSld>
+    <p:bg>
+      <p:bgRef idx="1001">
+        <a:schemeClr val="bg1"/>
+      </p:bgRef>
+    </p:bg>
+    <p:spTree>
+      <p:nvGrpSpPr>
+        <p:cNvPr id="1" name=""/>
+        <p:cNvGrpSpPr/>
+        <p:nvPr/>
+      </p:nvGrpSpPr>
+      <p:grpSpPr>
+        <a:xfrm>
+          <a:off x="0" y="0"/>
+          <a:ext cx="0" cy="0"/>
+          <a:chOff x="0" y="0"/>
+          <a:chExt cx="0" cy="0"/>
+        </a:xfrm>
+      </p:grpSpPr>
+      <p:sp>
+        <p:nvSpPr>
+          <p:cNvPr id="2" name="页眉占位符 1"/>
+          <p:cNvSpPr>
+            <a:spLocks noGrp="1"/>
+          </p:cNvSpPr>
+          <p:nvPr>
+            <p:ph type="hdr" sz="quarter"/>
+          </p:nvPr>
+        </p:nvSpPr>
+        <p:spPr>
+          <a:xfrm>
+            <a:off x="0" y="0"/>
+            <a:ext cx="2971800" cy="458788"/>
+          </a:xfrm>
+          <a:prstGeom prst="rect">
+            <a:avLst/>
+          </a:prstGeom>
+        </p:spPr>
+        <p:txBody>
+          <a:bodyPr vert="horz" lIns="91440" tIns="45720" rIns="91440" bIns="45720" rtlCol="0"/>
+          <a:lstStyle>
+            <a:lvl1pPr algn="l">
+              <a:defRPr sz="1200"/>
+            </a:lvl1pPr>
+          </a:lstStyle>
+          <a:p>
+            <a:endParaRPr lang="zh-CN" altLang="en-US"/>
+          </a:p>
+        </p:txBody>
+      </p:sp>
+      <p:sp>
+        <p:nvSpPr>
+          <p:cNvPr id="3" name="日期占位符 2"/>
+          <p:cNvSpPr>
+            <a:spLocks noGrp="1"/>
+          </p:cNvSpPr>
+          <p:nvPr>
+            <p:ph type="dt" idx="1"/>
+          </p:nvPr>
+        </p:nvSpPr>
+        <p:spPr>
+          <a:xfrm>
+            <a:off x="3884613" y="0"/>
+            <a:ext cx="2971800" cy="458788"/>
+          </a:xfrm>
+          <a:prstGeom prst="rect">
+            <a:avLst/>
+          </a:prstGeom>
+        </p:spPr>
+        <p:txBody>
+          <a:bodyPr vert="horz" lIns="91440" tIns="45720" rIns="91440" bIns="45720" rtlCol="0"/>
+          <a:lstStyle>
+            <a:lvl1pPr algn="r">
+              <a:defRPr sz="1200"/>
+            </a:lvl1pPr>
+          </a:lstStyle>
+          <a:p>
+            <a:fld id="{FAAEFEE4-5241-476D-A270-E097B1D7E668}" type="datetimeFigureOut">
+              <a:rPr lang="zh-CN" altLang="en-US" smtClean="0"/>
+              <a:t>2023/10/6</a:t>
+            </a:fld>
+            <a:endParaRPr lang="zh-CN" altLang="en-US"/>
+          </a:p>
+        </p:txBody>
+      </p:sp>
+      <p:sp>
+        <p:nvSpPr>
+          <p:cNvPr id="4" name="幻灯片图像占位符 3"/>
+          <p:cNvSpPr>
+            <a:spLocks noGrp="1" noRot="1" noChangeAspect="1"/>
+          </p:cNvSpPr>
+          <p:nvPr>
+            <p:ph type="sldImg" idx="2"/>
+          </p:nvPr>
+        </p:nvSpPr>
+        <p:spPr>
+          <a:xfrm>
+            <a:off x="685800" y="1143000"/>
+            <a:ext cx="5486400" cy="3086100"/>
+          </a:xfrm>
+          <a:prstGeom prst="rect">
+            <a:avLst/>
+          </a:prstGeom>
+          <a:noFill/>
+          <a:ln w="12700">
+            <a:solidFill>
+              <a:prstClr val="black"/>
+            </a:solidFill>
+          </a:ln>
+        </p:spPr>
+        <p:txBody>
+          <a:bodyPr vert="horz" lIns="91440" tIns="45720" rIns="91440" bIns="45720" rtlCol="0" anchor="ctr"/>
+          <a:lstStyle/>
+          <a:p>
+            <a:endParaRPr lang="zh-CN" altLang="en-US"/>
+          </a:p>
+        </p:txBody>
+      </p:sp>
+      <p:sp>
+        <p:nvSpPr>
+          <p:cNvPr id="5" name="备注占位符 4"/>
+          <p:cNvSpPr>
+            <a:spLocks noGrp="1"/>
+          </p:cNvSpPr>
+          <p:nvPr>
+            <p:ph type="body" sz="quarter" idx="3"/>
+          </p:nvPr>
+        </p:nvSpPr>
+        <p:spPr>
+          <a:xfrm>
+            <a:off x="685800" y="4400550"/>
+            <a:ext cx="5486400" cy="3600450"/>
+          </a:xfrm>
+          <a:prstGeom prst="rect">
+            <a:avLst/>
+          </a:prstGeom>
+        </p:spPr>
+        <p:txBody>
+          <a:bodyPr vert="horz" lIns="91440" tIns="45720" rIns="91440" bIns="45720" rtlCol="0"/>
+          <a:lstStyle/>
+          <a:p>
+            <a:pPr lvl="0"/>
+            <a:r>
+              <a:rPr lang="zh-CN" altLang="en-US"/>
+              <a:t>单击此处编辑母版文本样式</a:t>
+            </a:r>
+          </a:p>
+          <a:p>
+            <a:pPr lvl="1"/>
+            <a:r>
+              <a:rPr lang="zh-CN" altLang="en-US"/>
+              <a:t>二级</a:t>
+            </a:r>
+          </a:p>
+          <a:p>
+            <a:pPr lvl="2"/>
+            <a:r>
+              <a:rPr lang="zh-CN" altLang="en-US"/>
+              <a:t>三级</a:t>
+            </a:r>
+          </a:p>
+          <a:p>
+            <a:pPr lvl="3"/>
+            <a:r>
+              <a:rPr lang="zh-CN" altLang="en-US"/>
+              <a:t>四级</a:t>
+            </a:r>
+          </a:p>
+          <a:p>
+            <a:pPr lvl="4"/>
+            <a:r>
+              <a:rPr lang="zh-CN" altLang="en-US"/>
+              <a:t>五级</a:t>
+            </a:r>
+          </a:p>
+        </p:txBody>
+      </p:sp>
+      <p:sp>
+        <p:nvSpPr>
+          <p:cNvPr id="6" name="页脚占位符 5"/>
+          <p:cNvSpPr>
+            <a:spLocks noGrp="1"/>
+          </p:cNvSpPr>
+          <p:nvPr>
+            <p:ph type="ftr" sz="quarter" idx="4"/>
+          </p:nvPr>
+        </p:nvSpPr>
+        <p:spPr>
+          <a:xfrm>
+            <a:off x="0" y="8685213"/>
+            <a:ext cx="2971800" cy="458787"/>
+          </a:xfrm>
+          <a:prstGeom prst="rect">
+            <a:avLst/>
+          </a:prstGeom>
+        </p:spPr>
+        <p:txBody>
+          <a:bodyPr vert="horz" lIns="91440" tIns="45720" rIns="91440" bIns="45720" rtlCol="0" anchor="b"/>
+          <a:lstStyle>
+            <a:lvl1pPr algn="l">
+              <a:defRPr sz="1200"/>
+            </a:lvl1pPr>
+          </a:lstStyle>
+          <a:p>
+            <a:endParaRPr lang="zh-CN" altLang="en-US"/>
+          </a:p>
+        </p:txBody>
+      </p:sp>
+      <p:sp>
+        <p:nvSpPr>
+          <p:cNvPr id="7" name="灯片编号占位符 6"/>
+          <p:cNvSpPr>
+            <a:spLocks noGrp="1"/>
+          </p:cNvSpPr>
+          <p:nvPr>
+            <p:ph type="sldNum" sz="quarter" idx="5"/>
+          </p:nvPr>
+        </p:nvSpPr>
+        <p:spPr>
+          <a:xfrm>
+            <a:off x="3884613" y="8685213"/>
+            <a:ext cx="2971800" cy="458787"/>
+          </a:xfrm>
+          <a:prstGeom prst="rect">
+            <a:avLst/>
+          </a:prstGeom>
+        </p:spPr>
+        <p:txBody>
+          <a:bodyPr vert="horz" lIns="91440" tIns="45720" rIns="91440" bIns="45720" rtlCol="0" anchor="b"/>
+          <a:lstStyle>
+            <a:lvl1pPr algn="r">
+              <a:defRPr sz="1200"/>
+            </a:lvl1pPr>
+          </a:lstStyle>
+          <a:p>
+            <a:fld id="{DB4026C6-A45E-455A-8608-93E05E851B40}" type="slidenum">
+              <a:rPr lang="zh-CN" altLang="en-US" smtClean="0"/>
+              <a:t>‹#›</a:t>
+            </a:fld>
+            <a:endParaRPr lang="zh-CN" altLang="en-US"/>
+          </a:p>
+        </p:txBody>
+      </p:sp>
+    </p:spTree>
+    <p:extLst>
+      <p:ext uri="{BB962C8B-B14F-4D97-AF65-F5344CB8AC3E}">
+        <p14:creationId xmlns:p14="http://schemas.microsoft.com/office/powerpoint/2010/main" val="326526341"/>
+      </p:ext>
+    </p:extLst>
+  </p:cSld>
+  <p:clrMap bg1="lt1" tx1="dk1" bg2="lt2" tx2="dk2" accent1="accent1" accent2="accent2" accent3="accent3" accent4="accent4" accent5="accent5" accent6="accent6" hlink="hlink" folHlink="folHlink"/>
+  <p:notesStyle>
+    <a:lvl1pPr marL="0" algn="l" defTabSz="914400" rtl="0" eaLnBrk="1" latinLnBrk="0" hangingPunct="1">
+      <a:defRPr sz="1200" kern="1200">
+        <a:solidFill>
+          <a:schemeClr val="tx1"/>
+        </a:solidFill>
+        <a:latin typeface="+mn-lt"/>
+        <a:ea typeface="+mn-ea"/>
+        <a:cs typeface="+mn-cs"/>
+      </a:defRPr>
+    </a:lvl1pPr>
+    <a:lvl2pPr marL="457200" algn="l" defTabSz="914400" rtl="0" eaLnBrk="1" latinLnBrk="0" hangingPunct="1">
+      <a:defRPr sz="1200" kern="1200">
+        <a:solidFill>
+          <a:schemeClr val="tx1"/>
+        </a:solidFill>
+        <a:latin typeface="+mn-lt"/>
+        <a:ea typeface="+mn-ea"/>
+        <a:cs typeface="+mn-cs"/>
+      </a:defRPr>
+    </a:lvl2pPr>
+    <a:lvl3pPr marL="914400" algn="l" defTabSz="914400" rtl="0" eaLnBrk="1" latinLnBrk="0" hangingPunct="1">
+      <a:defRPr sz="1200" kern="1200">
+        <a:solidFill>
+          <a:schemeClr val="tx1"/>
+        </a:solidFill>
+        <a:latin typeface="+mn-lt"/>
+        <a:ea typeface="+mn-ea"/>
+        <a:cs typeface="+mn-cs"/>
+      </a:defRPr>
+    </a:lvl3pPr>
+    <a:lvl4pPr marL="1371600" algn="l" defTabSz="914400" rtl="0" eaLnBrk="1" latinLnBrk="0" hangingPunct="1">
+      <a:defRPr sz="1200" kern="1200">
+        <a:solidFill>
+          <a:schemeClr val="tx1"/>
+        </a:solidFill>
+        <a:latin typeface="+mn-lt"/>
+        <a:ea typeface="+mn-ea"/>
+        <a:cs typeface="+mn-cs"/>
+      </a:defRPr>
+    </a:lvl4pPr>
+    <a:lvl5pPr marL="1828800" algn="l" defTabSz="914400" rtl="0" eaLnBrk="1" latinLnBrk="0" hangingPunct="1">
+      <a:defRPr sz="1200" kern="1200">
+        <a:solidFill>
+          <a:schemeClr val="tx1"/>
+        </a:solidFill>
+        <a:latin typeface="+mn-lt"/>
+        <a:ea typeface="+mn-ea"/>
+        <a:cs typeface="+mn-cs"/>
+      </a:defRPr>
+    </a:lvl5pPr>
+    <a:lvl6pPr marL="2286000" algn="l" defTabSz="914400" rtl="0" eaLnBrk="1" latinLnBrk="0" hangingPunct="1">
+      <a:defRPr sz="1200" kern="1200">
+        <a:solidFill>
+          <a:schemeClr val="tx1"/>
+        </a:solidFill>
+        <a:latin typeface="+mn-lt"/>
+        <a:ea typeface="+mn-ea"/>
+        <a:cs typeface="+mn-cs"/>
+      </a:defRPr>
+    </a:lvl6pPr>
+    <a:lvl7pPr marL="2743200" algn="l" defTabSz="914400" rtl="0" eaLnBrk="1" latinLnBrk="0" hangingPunct="1">
+      <a:defRPr sz="1200" kern="1200">
+        <a:solidFill>
+          <a:schemeClr val="tx1"/>
+        </a:solidFill>
+        <a:latin typeface="+mn-lt"/>
+        <a:ea typeface="+mn-ea"/>
+        <a:cs typeface="+mn-cs"/>
+      </a:defRPr>
+    </a:lvl7pPr>
+    <a:lvl8pPr marL="3200400" algn="l" defTabSz="914400" rtl="0" eaLnBrk="1" latinLnBrk="0" hangingPunct="1">
+      <a:defRPr sz="1200" kern="1200">
+        <a:solidFill>
+          <a:schemeClr val="tx1"/>
+        </a:solidFill>
+        <a:latin typeface="+mn-lt"/>
+        <a:ea typeface="+mn-ea"/>
+        <a:cs typeface="+mn-cs"/>
+      </a:defRPr>
+    </a:lvl8pPr>
+    <a:lvl9pPr marL="3657600" algn="l" defTabSz="914400" rtl="0" eaLnBrk="1" latinLnBrk="0" hangingPunct="1">
+      <a:defRPr sz="1200" kern="1200">
+        <a:solidFill>
+          <a:schemeClr val="tx1"/>
+        </a:solidFill>
+        <a:latin typeface="+mn-lt"/>
+        <a:ea typeface="+mn-ea"/>
+        <a:cs typeface="+mn-cs"/>
+      </a:defRPr>
+    </a:lvl9pPr>
+  </p:notesStyle>
+</p:notesMaster>
+</file>
+
+<file path=ppt/notesSlides/notesSlide1.xml><?xml version="1.0" encoding="utf-8"?>
+<p:notes xmlns:a="http://schemas.openxmlformats.org/drawingml/2006/main" xmlns:r="http://schemas.openxmlformats.org/officeDocument/2006/relationships" xmlns:p="http://schemas.openxmlformats.org/presentationml/2006/main">
+  <p:cSld>
+    <p:spTree>
+      <p:nvGrpSpPr>
+        <p:cNvPr id="1" name=""/>
+        <p:cNvGrpSpPr/>
+        <p:nvPr/>
+      </p:nvGrpSpPr>
+      <p:grpSpPr>
+        <a:xfrm>
+          <a:off x="0" y="0"/>
+          <a:ext cx="0" cy="0"/>
+          <a:chOff x="0" y="0"/>
+          <a:chExt cx="0" cy="0"/>
+        </a:xfrm>
+      </p:grpSpPr>
+      <p:sp>
+        <p:nvSpPr>
+          <p:cNvPr id="2" name="幻灯片图像占位符 1"/>
+          <p:cNvSpPr>
+            <a:spLocks noGrp="1" noRot="1" noChangeAspect="1"/>
+          </p:cNvSpPr>
+          <p:nvPr>
+            <p:ph type="sldImg"/>
+          </p:nvPr>
+        </p:nvSpPr>
+        <p:spPr/>
+      </p:sp>
+      <p:sp>
+        <p:nvSpPr>
+          <p:cNvPr id="3" name="备注占位符 2"/>
+          <p:cNvSpPr>
+            <a:spLocks noGrp="1"/>
+          </p:cNvSpPr>
+          <p:nvPr>
+            <p:ph type="body" idx="1"/>
+          </p:nvPr>
+        </p:nvSpPr>
+        <p:spPr/>
+        <p:txBody>
+          <a:bodyPr/>
+          <a:lstStyle/>
+          <a:p>
+            <a:r>
+              <a:rPr lang="en-US" altLang="zh-CN" dirty="0"/>
+              <a:t>Original Version</a:t>
+            </a:r>
+            <a:endParaRPr lang="zh-CN" altLang="en-US" dirty="0"/>
+          </a:p>
+        </p:txBody>
+      </p:sp>
+      <p:sp>
+        <p:nvSpPr>
+          <p:cNvPr id="4" name="灯片编号占位符 3"/>
+          <p:cNvSpPr>
+            <a:spLocks noGrp="1"/>
+          </p:cNvSpPr>
+          <p:nvPr>
+            <p:ph type="sldNum" sz="quarter" idx="5"/>
+          </p:nvPr>
+        </p:nvSpPr>
+        <p:spPr/>
+        <p:txBody>
+          <a:bodyPr/>
+          <a:lstStyle/>
+          <a:p>
+            <a:fld id="{DB4026C6-A45E-455A-8608-93E05E851B40}" type="slidenum">
+              <a:rPr lang="zh-CN" altLang="en-US" smtClean="0"/>
+              <a:t>1</a:t>
+            </a:fld>
+            <a:endParaRPr lang="zh-CN" altLang="en-US"/>
+          </a:p>
+        </p:txBody>
+      </p:sp>
+    </p:spTree>
+    <p:extLst>
+      <p:ext uri="{BB962C8B-B14F-4D97-AF65-F5344CB8AC3E}">
+        <p14:creationId xmlns:p14="http://schemas.microsoft.com/office/powerpoint/2010/main" val="3331832113"/>
+      </p:ext>
+    </p:extLst>
+  </p:cSld>
+  <p:clrMapOvr>
+    <a:masterClrMapping/>
+  </p:clrMapOvr>
+</p:notes>
+</file>
+
+<file path=ppt/notesSlides/notesSlide2.xml><?xml version="1.0" encoding="utf-8"?>
+<p:notes xmlns:a="http://schemas.openxmlformats.org/drawingml/2006/main" xmlns:r="http://schemas.openxmlformats.org/officeDocument/2006/relationships" xmlns:p="http://schemas.openxmlformats.org/presentationml/2006/main">
+  <p:cSld>
+    <p:spTree>
+      <p:nvGrpSpPr>
+        <p:cNvPr id="1" name=""/>
+        <p:cNvGrpSpPr/>
+        <p:nvPr/>
+      </p:nvGrpSpPr>
+      <p:grpSpPr>
+        <a:xfrm>
+          <a:off x="0" y="0"/>
+          <a:ext cx="0" cy="0"/>
+          <a:chOff x="0" y="0"/>
+          <a:chExt cx="0" cy="0"/>
+        </a:xfrm>
+      </p:grpSpPr>
+      <p:sp>
+        <p:nvSpPr>
+          <p:cNvPr id="2" name="幻灯片图像占位符 1"/>
+          <p:cNvSpPr>
+            <a:spLocks noGrp="1" noRot="1" noChangeAspect="1"/>
+          </p:cNvSpPr>
+          <p:nvPr>
+            <p:ph type="sldImg"/>
+          </p:nvPr>
+        </p:nvSpPr>
+        <p:spPr/>
+      </p:sp>
+      <p:sp>
+        <p:nvSpPr>
+          <p:cNvPr id="3" name="备注占位符 2"/>
+          <p:cNvSpPr>
+            <a:spLocks noGrp="1"/>
+          </p:cNvSpPr>
+          <p:nvPr>
+            <p:ph type="body" idx="1"/>
+          </p:nvPr>
+        </p:nvSpPr>
+        <p:spPr/>
+        <p:txBody>
+          <a:bodyPr/>
+          <a:lstStyle/>
+          <a:p>
+            <a:r>
+              <a:rPr lang="en-US" altLang="zh-CN" dirty="0"/>
+              <a:t>Revision 1</a:t>
+            </a:r>
+          </a:p>
+          <a:p>
+            <a:pPr marL="171450" indent="-171450">
+              <a:buFont typeface="Arial" panose="020B0604020202020204" pitchFamily="34" charset="0"/>
+              <a:buChar char="•"/>
+            </a:pPr>
+            <a:endParaRPr lang="en-US" altLang="zh-CN" dirty="0"/>
+          </a:p>
+          <a:p>
+            <a:pPr marL="171450" indent="-171450">
+              <a:buFont typeface="Arial" panose="020B0604020202020204" pitchFamily="34" charset="0"/>
+              <a:buChar char="•"/>
+            </a:pPr>
+            <a:endParaRPr lang="en-US" altLang="zh-CN" dirty="0"/>
+          </a:p>
+          <a:p>
+            <a:pPr marL="171450" indent="-171450">
+              <a:buFont typeface="Arial" panose="020B0604020202020204" pitchFamily="34" charset="0"/>
+              <a:buChar char="•"/>
+            </a:pPr>
+            <a:endParaRPr lang="zh-CN" altLang="en-US" dirty="0"/>
+          </a:p>
+        </p:txBody>
+      </p:sp>
+      <p:sp>
+        <p:nvSpPr>
+          <p:cNvPr id="4" name="灯片编号占位符 3"/>
+          <p:cNvSpPr>
+            <a:spLocks noGrp="1"/>
+          </p:cNvSpPr>
+          <p:nvPr>
+            <p:ph type="sldNum" sz="quarter" idx="5"/>
+          </p:nvPr>
+        </p:nvSpPr>
+        <p:spPr/>
+        <p:txBody>
+          <a:bodyPr/>
+          <a:lstStyle/>
+          <a:p>
+            <a:fld id="{DB4026C6-A45E-455A-8608-93E05E851B40}" type="slidenum">
+              <a:rPr lang="zh-CN" altLang="en-US" smtClean="0"/>
+              <a:t>2</a:t>
+            </a:fld>
+            <a:endParaRPr lang="zh-CN" altLang="en-US"/>
+          </a:p>
+        </p:txBody>
+      </p:sp>
+    </p:spTree>
+    <p:extLst>
+      <p:ext uri="{BB962C8B-B14F-4D97-AF65-F5344CB8AC3E}">
+        <p14:creationId xmlns:p14="http://schemas.microsoft.com/office/powerpoint/2010/main" val="2320015982"/>
+      </p:ext>
+    </p:extLst>
+  </p:cSld>
+  <p:clrMapOvr>
+    <a:masterClrMapping/>
+  </p:clrMapOvr>
+</p:notes>
+</file>
+
+<file path=ppt/notesSlides/notesSlide3.xml><?xml version="1.0" encoding="utf-8"?>
+<p:notes xmlns:a="http://schemas.openxmlformats.org/drawingml/2006/main" xmlns:r="http://schemas.openxmlformats.org/officeDocument/2006/relationships" xmlns:p="http://schemas.openxmlformats.org/presentationml/2006/main">
+  <p:cSld>
+    <p:spTree>
+      <p:nvGrpSpPr>
+        <p:cNvPr id="1" name=""/>
+        <p:cNvGrpSpPr/>
+        <p:nvPr/>
+      </p:nvGrpSpPr>
+      <p:grpSpPr>
+        <a:xfrm>
+          <a:off x="0" y="0"/>
+          <a:ext cx="0" cy="0"/>
+          <a:chOff x="0" y="0"/>
+          <a:chExt cx="0" cy="0"/>
+        </a:xfrm>
+      </p:grpSpPr>
+      <p:sp>
+        <p:nvSpPr>
+          <p:cNvPr id="2" name="幻灯片图像占位符 1"/>
+          <p:cNvSpPr>
+            <a:spLocks noGrp="1" noRot="1" noChangeAspect="1"/>
+          </p:cNvSpPr>
+          <p:nvPr>
+            <p:ph type="sldImg"/>
+          </p:nvPr>
+        </p:nvSpPr>
+        <p:spPr/>
+      </p:sp>
+      <p:sp>
+        <p:nvSpPr>
+          <p:cNvPr id="3" name="备注占位符 2"/>
+          <p:cNvSpPr>
+            <a:spLocks noGrp="1"/>
+          </p:cNvSpPr>
+          <p:nvPr>
+            <p:ph type="body" idx="1"/>
+          </p:nvPr>
+        </p:nvSpPr>
+        <p:spPr/>
+        <p:txBody>
+          <a:bodyPr/>
+          <a:lstStyle/>
+          <a:p>
+            <a:endParaRPr lang="zh-CN" altLang="en-US" dirty="0"/>
+          </a:p>
+        </p:txBody>
+      </p:sp>
+      <p:sp>
+        <p:nvSpPr>
+          <p:cNvPr id="4" name="灯片编号占位符 3"/>
+          <p:cNvSpPr>
+            <a:spLocks noGrp="1"/>
+          </p:cNvSpPr>
+          <p:nvPr>
+            <p:ph type="sldNum" sz="quarter" idx="5"/>
+          </p:nvPr>
+        </p:nvSpPr>
+        <p:spPr/>
+        <p:txBody>
+          <a:bodyPr/>
+          <a:lstStyle/>
+          <a:p>
+            <a:fld id="{DB4026C6-A45E-455A-8608-93E05E851B40}" type="slidenum">
+              <a:rPr lang="zh-CN" altLang="en-US" smtClean="0"/>
+              <a:t>3</a:t>
+            </a:fld>
+            <a:endParaRPr lang="zh-CN" altLang="en-US"/>
+          </a:p>
+        </p:txBody>
+      </p:sp>
+    </p:spTree>
+    <p:extLst>
+      <p:ext uri="{BB962C8B-B14F-4D97-AF65-F5344CB8AC3E}">
+        <p14:creationId xmlns:p14="http://schemas.microsoft.com/office/powerpoint/2010/main" val="254929210"/>
+      </p:ext>
+    </p:extLst>
+  </p:cSld>
+  <p:clrMapOvr>
+    <a:masterClrMapping/>
+  </p:clrMapOvr>
+</p:notes>
 </file>
 
 <file path=ppt/slideLayouts/slideLayout1.xml><?xml version="1.0" encoding="utf-8"?>
@@ -255,7 +893,7 @@
           <a:p>
             <a:fld id="{3446BE64-2E24-4CF0-9390-8E701061B494}" type="datetimeFigureOut">
               <a:rPr lang="zh-CN" altLang="en-US" smtClean="0"/>
-              <a:t>2023/9/28</a:t>
+              <a:t>2023/10/6</a:t>
             </a:fld>
             <a:endParaRPr lang="zh-CN" altLang="en-US"/>
           </a:p>
@@ -453,7 +1091,7 @@
           <a:p>
             <a:fld id="{3446BE64-2E24-4CF0-9390-8E701061B494}" type="datetimeFigureOut">
               <a:rPr lang="zh-CN" altLang="en-US" smtClean="0"/>
-              <a:t>2023/9/28</a:t>
+              <a:t>2023/10/6</a:t>
             </a:fld>
             <a:endParaRPr lang="zh-CN" altLang="en-US"/>
           </a:p>
@@ -661,7 +1299,7 @@
           <a:p>
             <a:fld id="{3446BE64-2E24-4CF0-9390-8E701061B494}" type="datetimeFigureOut">
               <a:rPr lang="zh-CN" altLang="en-US" smtClean="0"/>
-              <a:t>2023/9/28</a:t>
+              <a:t>2023/10/6</a:t>
             </a:fld>
             <a:endParaRPr lang="zh-CN" altLang="en-US"/>
           </a:p>
@@ -859,7 +1497,7 @@
           <a:p>
             <a:fld id="{3446BE64-2E24-4CF0-9390-8E701061B494}" type="datetimeFigureOut">
               <a:rPr lang="zh-CN" altLang="en-US" smtClean="0"/>
-              <a:t>2023/9/28</a:t>
+              <a:t>2023/10/6</a:t>
             </a:fld>
             <a:endParaRPr lang="zh-CN" altLang="en-US"/>
           </a:p>
@@ -1134,7 +1772,7 @@
           <a:p>
             <a:fld id="{3446BE64-2E24-4CF0-9390-8E701061B494}" type="datetimeFigureOut">
               <a:rPr lang="zh-CN" altLang="en-US" smtClean="0"/>
-              <a:t>2023/9/28</a:t>
+              <a:t>2023/10/6</a:t>
             </a:fld>
             <a:endParaRPr lang="zh-CN" altLang="en-US"/>
           </a:p>
@@ -1399,7 +2037,7 @@
           <a:p>
             <a:fld id="{3446BE64-2E24-4CF0-9390-8E701061B494}" type="datetimeFigureOut">
               <a:rPr lang="zh-CN" altLang="en-US" smtClean="0"/>
-              <a:t>2023/9/28</a:t>
+              <a:t>2023/10/6</a:t>
             </a:fld>
             <a:endParaRPr lang="zh-CN" altLang="en-US"/>
           </a:p>
@@ -1811,7 +2449,7 @@
           <a:p>
             <a:fld id="{3446BE64-2E24-4CF0-9390-8E701061B494}" type="datetimeFigureOut">
               <a:rPr lang="zh-CN" altLang="en-US" smtClean="0"/>
-              <a:t>2023/9/28</a:t>
+              <a:t>2023/10/6</a:t>
             </a:fld>
             <a:endParaRPr lang="zh-CN" altLang="en-US"/>
           </a:p>
@@ -1952,7 +2590,7 @@
           <a:p>
             <a:fld id="{3446BE64-2E24-4CF0-9390-8E701061B494}" type="datetimeFigureOut">
               <a:rPr lang="zh-CN" altLang="en-US" smtClean="0"/>
-              <a:t>2023/9/28</a:t>
+              <a:t>2023/10/6</a:t>
             </a:fld>
             <a:endParaRPr lang="zh-CN" altLang="en-US"/>
           </a:p>
@@ -2065,7 +2703,7 @@
           <a:p>
             <a:fld id="{3446BE64-2E24-4CF0-9390-8E701061B494}" type="datetimeFigureOut">
               <a:rPr lang="zh-CN" altLang="en-US" smtClean="0"/>
-              <a:t>2023/9/28</a:t>
+              <a:t>2023/10/6</a:t>
             </a:fld>
             <a:endParaRPr lang="zh-CN" altLang="en-US"/>
           </a:p>
@@ -2376,7 +3014,7 @@
           <a:p>
             <a:fld id="{3446BE64-2E24-4CF0-9390-8E701061B494}" type="datetimeFigureOut">
               <a:rPr lang="zh-CN" altLang="en-US" smtClean="0"/>
-              <a:t>2023/9/28</a:t>
+              <a:t>2023/10/6</a:t>
             </a:fld>
             <a:endParaRPr lang="zh-CN" altLang="en-US"/>
           </a:p>
@@ -2664,7 +3302,7 @@
           <a:p>
             <a:fld id="{3446BE64-2E24-4CF0-9390-8E701061B494}" type="datetimeFigureOut">
               <a:rPr lang="zh-CN" altLang="en-US" smtClean="0"/>
-              <a:t>2023/9/28</a:t>
+              <a:t>2023/10/6</a:t>
             </a:fld>
             <a:endParaRPr lang="zh-CN" altLang="en-US"/>
           </a:p>
@@ -2905,7 +3543,7 @@
           <a:p>
             <a:fld id="{3446BE64-2E24-4CF0-9390-8E701061B494}" type="datetimeFigureOut">
               <a:rPr lang="zh-CN" altLang="en-US" smtClean="0"/>
-              <a:t>2023/9/28</a:t>
+              <a:t>2023/10/6</a:t>
             </a:fld>
             <a:endParaRPr lang="zh-CN" altLang="en-US"/>
           </a:p>
@@ -3614,7 +4252,7 @@
             </a:pPr>
             <a:r>
               <a:rPr lang="en-US" altLang="zh-CN" dirty="0"/>
-              <a:t>3.1 Models (from data)</a:t>
+              <a:t>3.1 Models (from data structure)</a:t>
             </a:r>
           </a:p>
           <a:p>
@@ -3919,58 +4557,1346 @@
       </p:grpSpPr>
       <p:sp>
         <p:nvSpPr>
-          <p:cNvPr id="2" name="标题 1">
-            <a:extLst>
-              <a:ext uri="{FF2B5EF4-FFF2-40B4-BE49-F238E27FC236}">
-                <a16:creationId xmlns:a16="http://schemas.microsoft.com/office/drawing/2014/main" id="{FD656E00-2403-53BE-BBAC-665FD7B2231E}"/>
-              </a:ext>
-            </a:extLst>
-          </p:cNvPr>
-          <p:cNvSpPr>
-            <a:spLocks noGrp="1"/>
-          </p:cNvSpPr>
-          <p:nvPr>
-            <p:ph type="title"/>
-          </p:nvPr>
-        </p:nvSpPr>
-        <p:spPr/>
-        <p:txBody>
-          <a:bodyPr/>
+          <p:cNvPr id="3" name="内容占位符 2">
+            <a:extLst>
+              <a:ext uri="{FF2B5EF4-FFF2-40B4-BE49-F238E27FC236}">
+                <a16:creationId xmlns:a16="http://schemas.microsoft.com/office/drawing/2014/main" id="{045FD70F-167B-A83C-4E9D-C9A0144FC33E}"/>
+              </a:ext>
+            </a:extLst>
+          </p:cNvPr>
+          <p:cNvSpPr>
+            <a:spLocks noGrp="1"/>
+          </p:cNvSpPr>
+          <p:nvPr>
+            <p:ph idx="1"/>
+          </p:nvPr>
+        </p:nvSpPr>
+        <p:spPr>
+          <a:xfrm>
+            <a:off x="838200" y="180755"/>
+            <a:ext cx="11006470" cy="2658141"/>
+          </a:xfrm>
+        </p:spPr>
+        <p:txBody>
+          <a:bodyPr>
+            <a:normAutofit lnSpcReduction="10000"/>
+          </a:bodyPr>
           <a:lstStyle/>
           <a:p>
-            <a:endParaRPr lang="zh-CN" altLang="en-US"/>
-          </a:p>
-        </p:txBody>
-      </p:sp>
-      <p:sp>
-        <p:nvSpPr>
-          <p:cNvPr id="3" name="内容占位符 2">
-            <a:extLst>
-              <a:ext uri="{FF2B5EF4-FFF2-40B4-BE49-F238E27FC236}">
-                <a16:creationId xmlns:a16="http://schemas.microsoft.com/office/drawing/2014/main" id="{2FFBD98D-EB42-81F8-755E-36323FE3CABD}"/>
-              </a:ext>
-            </a:extLst>
-          </p:cNvPr>
-          <p:cNvSpPr>
-            <a:spLocks noGrp="1"/>
-          </p:cNvSpPr>
-          <p:nvPr>
-            <p:ph idx="1"/>
-          </p:nvPr>
-        </p:nvSpPr>
-        <p:spPr/>
-        <p:txBody>
-          <a:bodyPr/>
+            <a:pPr marL="514350" indent="-514350">
+              <a:buAutoNum type="arabicPeriod"/>
+            </a:pPr>
+            <a:r>
+              <a:rPr lang="en-US" altLang="zh-CN" sz="2400" b="1" dirty="0"/>
+              <a:t>Introduction</a:t>
+            </a:r>
+          </a:p>
+          <a:p>
+            <a:pPr marL="514350" indent="-514350">
+              <a:buAutoNum type="arabicPeriod"/>
+            </a:pPr>
+            <a:r>
+              <a:rPr lang="en-US" altLang="zh-CN" sz="2400" b="1" dirty="0"/>
+              <a:t>Overview of Operating System Tasks (Background)</a:t>
+            </a:r>
+          </a:p>
+          <a:p>
+            <a:pPr marL="457200" lvl="1" indent="0">
+              <a:buNone/>
+            </a:pPr>
+            <a:r>
+              <a:rPr lang="en-US" altLang="zh-CN" dirty="0"/>
+              <a:t>2.1 Task1: I/O Scheduling</a:t>
+            </a:r>
+          </a:p>
+          <a:p>
+            <a:pPr marL="457200" lvl="1" indent="0">
+              <a:buNone/>
+            </a:pPr>
+            <a:r>
+              <a:rPr lang="en-US" altLang="zh-CN" dirty="0"/>
+              <a:t>2.2 Task2: Scheduling</a:t>
+            </a:r>
+          </a:p>
+          <a:p>
+            <a:pPr marL="457200" lvl="1" indent="0">
+              <a:buNone/>
+            </a:pPr>
+            <a:r>
+              <a:rPr lang="en-US" altLang="zh-CN" dirty="0"/>
+              <a:t>2.3 Task3: Space Allocation</a:t>
+            </a:r>
+          </a:p>
+          <a:p>
+            <a:pPr marL="457200" lvl="1" indent="0">
+              <a:buNone/>
+            </a:pPr>
+            <a:r>
+              <a:rPr lang="en-US" altLang="zh-CN" dirty="0"/>
+              <a:t>2.4 Task4: Storage Management</a:t>
+            </a:r>
+          </a:p>
+          <a:p>
+            <a:pPr marL="457200" lvl="1" indent="0">
+              <a:buNone/>
+            </a:pPr>
+            <a:r>
+              <a:rPr lang="en-US" altLang="zh-CN" dirty="0"/>
+              <a:t>2.5 Task5: Network</a:t>
+            </a:r>
+          </a:p>
+        </p:txBody>
+      </p:sp>
+      <p:sp>
+        <p:nvSpPr>
+          <p:cNvPr id="4" name="内容占位符 2">
+            <a:extLst>
+              <a:ext uri="{FF2B5EF4-FFF2-40B4-BE49-F238E27FC236}">
+                <a16:creationId xmlns:a16="http://schemas.microsoft.com/office/drawing/2014/main" id="{88717713-596C-62BC-DF26-9B011FB98446}"/>
+              </a:ext>
+            </a:extLst>
+          </p:cNvPr>
+          <p:cNvSpPr txBox="1">
+            <a:spLocks/>
+          </p:cNvSpPr>
+          <p:nvPr/>
+        </p:nvSpPr>
+        <p:spPr>
+          <a:xfrm>
+            <a:off x="838200" y="2883197"/>
+            <a:ext cx="10515600" cy="2463210"/>
+          </a:xfrm>
+          <a:prstGeom prst="rect">
+            <a:avLst/>
+          </a:prstGeom>
+        </p:spPr>
+        <p:txBody>
+          <a:bodyPr vert="horz" lIns="91440" tIns="45720" rIns="91440" bIns="45720" rtlCol="0">
+            <a:normAutofit/>
+          </a:bodyPr>
+          <a:lstStyle>
+            <a:lvl1pPr marL="228600" indent="-228600" algn="l" defTabSz="914400" rtl="0" eaLnBrk="1" latinLnBrk="0" hangingPunct="1">
+              <a:lnSpc>
+                <a:spcPct val="90000"/>
+              </a:lnSpc>
+              <a:spcBef>
+                <a:spcPts val="1000"/>
+              </a:spcBef>
+              <a:buFont typeface="Arial" panose="020B0604020202020204" pitchFamily="34" charset="0"/>
+              <a:buChar char="•"/>
+              <a:defRPr sz="2800" kern="1200">
+                <a:solidFill>
+                  <a:schemeClr val="tx1"/>
+                </a:solidFill>
+                <a:latin typeface="+mn-lt"/>
+                <a:ea typeface="+mn-ea"/>
+                <a:cs typeface="+mn-cs"/>
+              </a:defRPr>
+            </a:lvl1pPr>
+            <a:lvl2pPr marL="685800" indent="-228600" algn="l" defTabSz="914400" rtl="0" eaLnBrk="1" latinLnBrk="0" hangingPunct="1">
+              <a:lnSpc>
+                <a:spcPct val="90000"/>
+              </a:lnSpc>
+              <a:spcBef>
+                <a:spcPts val="500"/>
+              </a:spcBef>
+              <a:buFont typeface="Arial" panose="020B0604020202020204" pitchFamily="34" charset="0"/>
+              <a:buChar char="•"/>
+              <a:defRPr sz="2400" kern="1200">
+                <a:solidFill>
+                  <a:schemeClr val="tx1"/>
+                </a:solidFill>
+                <a:latin typeface="+mn-lt"/>
+                <a:ea typeface="+mn-ea"/>
+                <a:cs typeface="+mn-cs"/>
+              </a:defRPr>
+            </a:lvl2pPr>
+            <a:lvl3pPr marL="1143000" indent="-228600" algn="l" defTabSz="914400" rtl="0" eaLnBrk="1" latinLnBrk="0" hangingPunct="1">
+              <a:lnSpc>
+                <a:spcPct val="90000"/>
+              </a:lnSpc>
+              <a:spcBef>
+                <a:spcPts val="500"/>
+              </a:spcBef>
+              <a:buFont typeface="Arial" panose="020B0604020202020204" pitchFamily="34" charset="0"/>
+              <a:buChar char="•"/>
+              <a:defRPr sz="2000" kern="1200">
+                <a:solidFill>
+                  <a:schemeClr val="tx1"/>
+                </a:solidFill>
+                <a:latin typeface="+mn-lt"/>
+                <a:ea typeface="+mn-ea"/>
+                <a:cs typeface="+mn-cs"/>
+              </a:defRPr>
+            </a:lvl3pPr>
+            <a:lvl4pPr marL="1600200" indent="-228600" algn="l" defTabSz="914400" rtl="0" eaLnBrk="1" latinLnBrk="0" hangingPunct="1">
+              <a:lnSpc>
+                <a:spcPct val="90000"/>
+              </a:lnSpc>
+              <a:spcBef>
+                <a:spcPts val="500"/>
+              </a:spcBef>
+              <a:buFont typeface="Arial" panose="020B0604020202020204" pitchFamily="34" charset="0"/>
+              <a:buChar char="•"/>
+              <a:defRPr sz="1800" kern="1200">
+                <a:solidFill>
+                  <a:schemeClr val="tx1"/>
+                </a:solidFill>
+                <a:latin typeface="+mn-lt"/>
+                <a:ea typeface="+mn-ea"/>
+                <a:cs typeface="+mn-cs"/>
+              </a:defRPr>
+            </a:lvl4pPr>
+            <a:lvl5pPr marL="2057400" indent="-228600" algn="l" defTabSz="914400" rtl="0" eaLnBrk="1" latinLnBrk="0" hangingPunct="1">
+              <a:lnSpc>
+                <a:spcPct val="90000"/>
+              </a:lnSpc>
+              <a:spcBef>
+                <a:spcPts val="500"/>
+              </a:spcBef>
+              <a:buFont typeface="Arial" panose="020B0604020202020204" pitchFamily="34" charset="0"/>
+              <a:buChar char="•"/>
+              <a:defRPr sz="1800" kern="1200">
+                <a:solidFill>
+                  <a:schemeClr val="tx1"/>
+                </a:solidFill>
+                <a:latin typeface="+mn-lt"/>
+                <a:ea typeface="+mn-ea"/>
+                <a:cs typeface="+mn-cs"/>
+              </a:defRPr>
+            </a:lvl5pPr>
+            <a:lvl6pPr marL="2514600" indent="-228600" algn="l" defTabSz="914400" rtl="0" eaLnBrk="1" latinLnBrk="0" hangingPunct="1">
+              <a:lnSpc>
+                <a:spcPct val="90000"/>
+              </a:lnSpc>
+              <a:spcBef>
+                <a:spcPts val="500"/>
+              </a:spcBef>
+              <a:buFont typeface="Arial" panose="020B0604020202020204" pitchFamily="34" charset="0"/>
+              <a:buChar char="•"/>
+              <a:defRPr sz="1800" kern="1200">
+                <a:solidFill>
+                  <a:schemeClr val="tx1"/>
+                </a:solidFill>
+                <a:latin typeface="+mn-lt"/>
+                <a:ea typeface="+mn-ea"/>
+                <a:cs typeface="+mn-cs"/>
+              </a:defRPr>
+            </a:lvl6pPr>
+            <a:lvl7pPr marL="2971800" indent="-228600" algn="l" defTabSz="914400" rtl="0" eaLnBrk="1" latinLnBrk="0" hangingPunct="1">
+              <a:lnSpc>
+                <a:spcPct val="90000"/>
+              </a:lnSpc>
+              <a:spcBef>
+                <a:spcPts val="500"/>
+              </a:spcBef>
+              <a:buFont typeface="Arial" panose="020B0604020202020204" pitchFamily="34" charset="0"/>
+              <a:buChar char="•"/>
+              <a:defRPr sz="1800" kern="1200">
+                <a:solidFill>
+                  <a:schemeClr val="tx1"/>
+                </a:solidFill>
+                <a:latin typeface="+mn-lt"/>
+                <a:ea typeface="+mn-ea"/>
+                <a:cs typeface="+mn-cs"/>
+              </a:defRPr>
+            </a:lvl7pPr>
+            <a:lvl8pPr marL="3429000" indent="-228600" algn="l" defTabSz="914400" rtl="0" eaLnBrk="1" latinLnBrk="0" hangingPunct="1">
+              <a:lnSpc>
+                <a:spcPct val="90000"/>
+              </a:lnSpc>
+              <a:spcBef>
+                <a:spcPts val="500"/>
+              </a:spcBef>
+              <a:buFont typeface="Arial" panose="020B0604020202020204" pitchFamily="34" charset="0"/>
+              <a:buChar char="•"/>
+              <a:defRPr sz="1800" kern="1200">
+                <a:solidFill>
+                  <a:schemeClr val="tx1"/>
+                </a:solidFill>
+                <a:latin typeface="+mn-lt"/>
+                <a:ea typeface="+mn-ea"/>
+                <a:cs typeface="+mn-cs"/>
+              </a:defRPr>
+            </a:lvl8pPr>
+            <a:lvl9pPr marL="3886200" indent="-228600" algn="l" defTabSz="914400" rtl="0" eaLnBrk="1" latinLnBrk="0" hangingPunct="1">
+              <a:lnSpc>
+                <a:spcPct val="90000"/>
+              </a:lnSpc>
+              <a:spcBef>
+                <a:spcPts val="500"/>
+              </a:spcBef>
+              <a:buFont typeface="Arial" panose="020B0604020202020204" pitchFamily="34" charset="0"/>
+              <a:buChar char="•"/>
+              <a:defRPr sz="1800" kern="1200">
+                <a:solidFill>
+                  <a:schemeClr val="tx1"/>
+                </a:solidFill>
+                <a:latin typeface="+mn-lt"/>
+                <a:ea typeface="+mn-ea"/>
+                <a:cs typeface="+mn-cs"/>
+              </a:defRPr>
+            </a:lvl9pPr>
+          </a:lstStyle>
+          <a:p>
+            <a:pPr marL="0" indent="0">
+              <a:buNone/>
+            </a:pPr>
+            <a:r>
+              <a:rPr lang="en-US" altLang="zh-CN" sz="2400" b="1" dirty="0"/>
+              <a:t>3. Machine Learning in These Tasks</a:t>
+            </a:r>
+          </a:p>
+          <a:p>
+            <a:pPr marL="457200" lvl="1" indent="0">
+              <a:buNone/>
+            </a:pPr>
+            <a:r>
+              <a:rPr lang="en-US" altLang="zh-CN" dirty="0"/>
+              <a:t>3.1 Task1: I/O Scheduling</a:t>
+            </a:r>
+          </a:p>
+          <a:p>
+            <a:pPr marL="457200" lvl="1" indent="0">
+              <a:buNone/>
+            </a:pPr>
+            <a:r>
+              <a:rPr lang="en-US" altLang="zh-CN" dirty="0"/>
+              <a:t>3.2 Task2: Scheduling</a:t>
+            </a:r>
+          </a:p>
+          <a:p>
+            <a:pPr marL="457200" lvl="1" indent="0">
+              <a:buNone/>
+            </a:pPr>
+            <a:r>
+              <a:rPr lang="en-US" altLang="zh-CN" dirty="0"/>
+              <a:t>3.3 Task3: Space Allocation</a:t>
+            </a:r>
+          </a:p>
+          <a:p>
+            <a:pPr marL="457200" lvl="1" indent="0">
+              <a:buNone/>
+            </a:pPr>
+            <a:r>
+              <a:rPr lang="en-US" altLang="zh-CN" dirty="0"/>
+              <a:t>3.4 Task4: Storage Management</a:t>
+            </a:r>
+          </a:p>
+          <a:p>
+            <a:pPr marL="457200" lvl="1" indent="0">
+              <a:buNone/>
+            </a:pPr>
+            <a:r>
+              <a:rPr lang="en-US" altLang="zh-CN" dirty="0"/>
+              <a:t>3.5 Task5: Network</a:t>
+            </a:r>
+          </a:p>
+          <a:p>
+            <a:pPr marL="457200" lvl="1" indent="0">
+              <a:buNone/>
+            </a:pPr>
+            <a:endParaRPr lang="en-US" altLang="zh-CN" dirty="0"/>
+          </a:p>
+        </p:txBody>
+      </p:sp>
+      <p:sp>
+        <p:nvSpPr>
+          <p:cNvPr id="5" name="内容占位符 2">
+            <a:extLst>
+              <a:ext uri="{FF2B5EF4-FFF2-40B4-BE49-F238E27FC236}">
+                <a16:creationId xmlns:a16="http://schemas.microsoft.com/office/drawing/2014/main" id="{BF2FB792-550A-9AB8-56FE-096B629EDE5F}"/>
+              </a:ext>
+            </a:extLst>
+          </p:cNvPr>
+          <p:cNvSpPr txBox="1">
+            <a:spLocks/>
+          </p:cNvSpPr>
+          <p:nvPr/>
+        </p:nvSpPr>
+        <p:spPr>
+          <a:xfrm>
+            <a:off x="838200" y="5346407"/>
+            <a:ext cx="10515600" cy="1373371"/>
+          </a:xfrm>
+          <a:prstGeom prst="rect">
+            <a:avLst/>
+          </a:prstGeom>
+        </p:spPr>
+        <p:txBody>
+          <a:bodyPr vert="horz" lIns="91440" tIns="45720" rIns="91440" bIns="45720" rtlCol="0">
+            <a:normAutofit/>
+          </a:bodyPr>
+          <a:lstStyle>
+            <a:lvl1pPr marL="228600" indent="-228600" algn="l" defTabSz="914400" rtl="0" eaLnBrk="1" latinLnBrk="0" hangingPunct="1">
+              <a:lnSpc>
+                <a:spcPct val="90000"/>
+              </a:lnSpc>
+              <a:spcBef>
+                <a:spcPts val="1000"/>
+              </a:spcBef>
+              <a:buFont typeface="Arial" panose="020B0604020202020204" pitchFamily="34" charset="0"/>
+              <a:buChar char="•"/>
+              <a:defRPr sz="2800" kern="1200">
+                <a:solidFill>
+                  <a:schemeClr val="tx1"/>
+                </a:solidFill>
+                <a:latin typeface="+mn-lt"/>
+                <a:ea typeface="+mn-ea"/>
+                <a:cs typeface="+mn-cs"/>
+              </a:defRPr>
+            </a:lvl1pPr>
+            <a:lvl2pPr marL="685800" indent="-228600" algn="l" defTabSz="914400" rtl="0" eaLnBrk="1" latinLnBrk="0" hangingPunct="1">
+              <a:lnSpc>
+                <a:spcPct val="90000"/>
+              </a:lnSpc>
+              <a:spcBef>
+                <a:spcPts val="500"/>
+              </a:spcBef>
+              <a:buFont typeface="Arial" panose="020B0604020202020204" pitchFamily="34" charset="0"/>
+              <a:buChar char="•"/>
+              <a:defRPr sz="2400" kern="1200">
+                <a:solidFill>
+                  <a:schemeClr val="tx1"/>
+                </a:solidFill>
+                <a:latin typeface="+mn-lt"/>
+                <a:ea typeface="+mn-ea"/>
+                <a:cs typeface="+mn-cs"/>
+              </a:defRPr>
+            </a:lvl2pPr>
+            <a:lvl3pPr marL="1143000" indent="-228600" algn="l" defTabSz="914400" rtl="0" eaLnBrk="1" latinLnBrk="0" hangingPunct="1">
+              <a:lnSpc>
+                <a:spcPct val="90000"/>
+              </a:lnSpc>
+              <a:spcBef>
+                <a:spcPts val="500"/>
+              </a:spcBef>
+              <a:buFont typeface="Arial" panose="020B0604020202020204" pitchFamily="34" charset="0"/>
+              <a:buChar char="•"/>
+              <a:defRPr sz="2000" kern="1200">
+                <a:solidFill>
+                  <a:schemeClr val="tx1"/>
+                </a:solidFill>
+                <a:latin typeface="+mn-lt"/>
+                <a:ea typeface="+mn-ea"/>
+                <a:cs typeface="+mn-cs"/>
+              </a:defRPr>
+            </a:lvl3pPr>
+            <a:lvl4pPr marL="1600200" indent="-228600" algn="l" defTabSz="914400" rtl="0" eaLnBrk="1" latinLnBrk="0" hangingPunct="1">
+              <a:lnSpc>
+                <a:spcPct val="90000"/>
+              </a:lnSpc>
+              <a:spcBef>
+                <a:spcPts val="500"/>
+              </a:spcBef>
+              <a:buFont typeface="Arial" panose="020B0604020202020204" pitchFamily="34" charset="0"/>
+              <a:buChar char="•"/>
+              <a:defRPr sz="1800" kern="1200">
+                <a:solidFill>
+                  <a:schemeClr val="tx1"/>
+                </a:solidFill>
+                <a:latin typeface="+mn-lt"/>
+                <a:ea typeface="+mn-ea"/>
+                <a:cs typeface="+mn-cs"/>
+              </a:defRPr>
+            </a:lvl4pPr>
+            <a:lvl5pPr marL="2057400" indent="-228600" algn="l" defTabSz="914400" rtl="0" eaLnBrk="1" latinLnBrk="0" hangingPunct="1">
+              <a:lnSpc>
+                <a:spcPct val="90000"/>
+              </a:lnSpc>
+              <a:spcBef>
+                <a:spcPts val="500"/>
+              </a:spcBef>
+              <a:buFont typeface="Arial" panose="020B0604020202020204" pitchFamily="34" charset="0"/>
+              <a:buChar char="•"/>
+              <a:defRPr sz="1800" kern="1200">
+                <a:solidFill>
+                  <a:schemeClr val="tx1"/>
+                </a:solidFill>
+                <a:latin typeface="+mn-lt"/>
+                <a:ea typeface="+mn-ea"/>
+                <a:cs typeface="+mn-cs"/>
+              </a:defRPr>
+            </a:lvl5pPr>
+            <a:lvl6pPr marL="2514600" indent="-228600" algn="l" defTabSz="914400" rtl="0" eaLnBrk="1" latinLnBrk="0" hangingPunct="1">
+              <a:lnSpc>
+                <a:spcPct val="90000"/>
+              </a:lnSpc>
+              <a:spcBef>
+                <a:spcPts val="500"/>
+              </a:spcBef>
+              <a:buFont typeface="Arial" panose="020B0604020202020204" pitchFamily="34" charset="0"/>
+              <a:buChar char="•"/>
+              <a:defRPr sz="1800" kern="1200">
+                <a:solidFill>
+                  <a:schemeClr val="tx1"/>
+                </a:solidFill>
+                <a:latin typeface="+mn-lt"/>
+                <a:ea typeface="+mn-ea"/>
+                <a:cs typeface="+mn-cs"/>
+              </a:defRPr>
+            </a:lvl6pPr>
+            <a:lvl7pPr marL="2971800" indent="-228600" algn="l" defTabSz="914400" rtl="0" eaLnBrk="1" latinLnBrk="0" hangingPunct="1">
+              <a:lnSpc>
+                <a:spcPct val="90000"/>
+              </a:lnSpc>
+              <a:spcBef>
+                <a:spcPts val="500"/>
+              </a:spcBef>
+              <a:buFont typeface="Arial" panose="020B0604020202020204" pitchFamily="34" charset="0"/>
+              <a:buChar char="•"/>
+              <a:defRPr sz="1800" kern="1200">
+                <a:solidFill>
+                  <a:schemeClr val="tx1"/>
+                </a:solidFill>
+                <a:latin typeface="+mn-lt"/>
+                <a:ea typeface="+mn-ea"/>
+                <a:cs typeface="+mn-cs"/>
+              </a:defRPr>
+            </a:lvl7pPr>
+            <a:lvl8pPr marL="3429000" indent="-228600" algn="l" defTabSz="914400" rtl="0" eaLnBrk="1" latinLnBrk="0" hangingPunct="1">
+              <a:lnSpc>
+                <a:spcPct val="90000"/>
+              </a:lnSpc>
+              <a:spcBef>
+                <a:spcPts val="500"/>
+              </a:spcBef>
+              <a:buFont typeface="Arial" panose="020B0604020202020204" pitchFamily="34" charset="0"/>
+              <a:buChar char="•"/>
+              <a:defRPr sz="1800" kern="1200">
+                <a:solidFill>
+                  <a:schemeClr val="tx1"/>
+                </a:solidFill>
+                <a:latin typeface="+mn-lt"/>
+                <a:ea typeface="+mn-ea"/>
+                <a:cs typeface="+mn-cs"/>
+              </a:defRPr>
+            </a:lvl8pPr>
+            <a:lvl9pPr marL="3886200" indent="-228600" algn="l" defTabSz="914400" rtl="0" eaLnBrk="1" latinLnBrk="0" hangingPunct="1">
+              <a:lnSpc>
+                <a:spcPct val="90000"/>
+              </a:lnSpc>
+              <a:spcBef>
+                <a:spcPts val="500"/>
+              </a:spcBef>
+              <a:buFont typeface="Arial" panose="020B0604020202020204" pitchFamily="34" charset="0"/>
+              <a:buChar char="•"/>
+              <a:defRPr sz="1800" kern="1200">
+                <a:solidFill>
+                  <a:schemeClr val="tx1"/>
+                </a:solidFill>
+                <a:latin typeface="+mn-lt"/>
+                <a:ea typeface="+mn-ea"/>
+                <a:cs typeface="+mn-cs"/>
+              </a:defRPr>
+            </a:lvl9pPr>
+          </a:lstStyle>
+          <a:p>
+            <a:pPr marL="0" indent="0">
+              <a:buNone/>
+            </a:pPr>
+            <a:r>
+              <a:rPr lang="en-US" altLang="zh-CN" sz="2400" b="1" dirty="0"/>
+              <a:t>5. General Framework</a:t>
+            </a:r>
+          </a:p>
+          <a:p>
+            <a:pPr marL="0" indent="0">
+              <a:buNone/>
+            </a:pPr>
+            <a:r>
+              <a:rPr lang="en-US" altLang="zh-CN" sz="2400" b="1" dirty="0"/>
+              <a:t>6. Open Problems (Challenges) and Future Works</a:t>
+            </a:r>
+          </a:p>
+          <a:p>
+            <a:pPr marL="0" indent="0">
+              <a:buNone/>
+            </a:pPr>
+            <a:r>
+              <a:rPr lang="en-US" altLang="zh-CN" sz="2400" b="1" dirty="0"/>
+              <a:t>7. Conclusion</a:t>
+            </a:r>
+          </a:p>
+          <a:p>
+            <a:pPr marL="457200" lvl="1" indent="0">
+              <a:buNone/>
+            </a:pPr>
+            <a:endParaRPr lang="en-US" altLang="zh-CN" dirty="0"/>
+          </a:p>
+        </p:txBody>
+      </p:sp>
+      <p:sp>
+        <p:nvSpPr>
+          <p:cNvPr id="6" name="文本框 5">
+            <a:extLst>
+              <a:ext uri="{FF2B5EF4-FFF2-40B4-BE49-F238E27FC236}">
+                <a16:creationId xmlns:a16="http://schemas.microsoft.com/office/drawing/2014/main" id="{6760A80F-7416-69A4-7793-A58C55F86F62}"/>
+              </a:ext>
+            </a:extLst>
+          </p:cNvPr>
+          <p:cNvSpPr txBox="1"/>
+          <p:nvPr/>
+        </p:nvSpPr>
+        <p:spPr>
+          <a:xfrm>
+            <a:off x="6098178" y="1509825"/>
+            <a:ext cx="5746492" cy="3782061"/>
+          </a:xfrm>
+          <a:custGeom>
+            <a:avLst/>
+            <a:gdLst>
+              <a:gd name="connsiteX0" fmla="*/ 0 w 5746492"/>
+              <a:gd name="connsiteY0" fmla="*/ 0 h 3782061"/>
+              <a:gd name="connsiteX1" fmla="*/ 689579 w 5746492"/>
+              <a:gd name="connsiteY1" fmla="*/ 0 h 3782061"/>
+              <a:gd name="connsiteX2" fmla="*/ 1321693 w 5746492"/>
+              <a:gd name="connsiteY2" fmla="*/ 0 h 3782061"/>
+              <a:gd name="connsiteX3" fmla="*/ 1896342 w 5746492"/>
+              <a:gd name="connsiteY3" fmla="*/ 0 h 3782061"/>
+              <a:gd name="connsiteX4" fmla="*/ 2585921 w 5746492"/>
+              <a:gd name="connsiteY4" fmla="*/ 0 h 3782061"/>
+              <a:gd name="connsiteX5" fmla="*/ 3275500 w 5746492"/>
+              <a:gd name="connsiteY5" fmla="*/ 0 h 3782061"/>
+              <a:gd name="connsiteX6" fmla="*/ 3792685 w 5746492"/>
+              <a:gd name="connsiteY6" fmla="*/ 0 h 3782061"/>
+              <a:gd name="connsiteX7" fmla="*/ 4367334 w 5746492"/>
+              <a:gd name="connsiteY7" fmla="*/ 0 h 3782061"/>
+              <a:gd name="connsiteX8" fmla="*/ 5056913 w 5746492"/>
+              <a:gd name="connsiteY8" fmla="*/ 0 h 3782061"/>
+              <a:gd name="connsiteX9" fmla="*/ 5746492 w 5746492"/>
+              <a:gd name="connsiteY9" fmla="*/ 0 h 3782061"/>
+              <a:gd name="connsiteX10" fmla="*/ 5746492 w 5746492"/>
+              <a:gd name="connsiteY10" fmla="*/ 615936 h 3782061"/>
+              <a:gd name="connsiteX11" fmla="*/ 5746492 w 5746492"/>
+              <a:gd name="connsiteY11" fmla="*/ 1042768 h 3782061"/>
+              <a:gd name="connsiteX12" fmla="*/ 5746492 w 5746492"/>
+              <a:gd name="connsiteY12" fmla="*/ 1658704 h 3782061"/>
+              <a:gd name="connsiteX13" fmla="*/ 5746492 w 5746492"/>
+              <a:gd name="connsiteY13" fmla="*/ 2236819 h 3782061"/>
+              <a:gd name="connsiteX14" fmla="*/ 5746492 w 5746492"/>
+              <a:gd name="connsiteY14" fmla="*/ 2814934 h 3782061"/>
+              <a:gd name="connsiteX15" fmla="*/ 5746492 w 5746492"/>
+              <a:gd name="connsiteY15" fmla="*/ 3317408 h 3782061"/>
+              <a:gd name="connsiteX16" fmla="*/ 5746492 w 5746492"/>
+              <a:gd name="connsiteY16" fmla="*/ 3782061 h 3782061"/>
+              <a:gd name="connsiteX17" fmla="*/ 5056913 w 5746492"/>
+              <a:gd name="connsiteY17" fmla="*/ 3782061 h 3782061"/>
+              <a:gd name="connsiteX18" fmla="*/ 4597194 w 5746492"/>
+              <a:gd name="connsiteY18" fmla="*/ 3782061 h 3782061"/>
+              <a:gd name="connsiteX19" fmla="*/ 3907615 w 5746492"/>
+              <a:gd name="connsiteY19" fmla="*/ 3782061 h 3782061"/>
+              <a:gd name="connsiteX20" fmla="*/ 3447895 w 5746492"/>
+              <a:gd name="connsiteY20" fmla="*/ 3782061 h 3782061"/>
+              <a:gd name="connsiteX21" fmla="*/ 2873246 w 5746492"/>
+              <a:gd name="connsiteY21" fmla="*/ 3782061 h 3782061"/>
+              <a:gd name="connsiteX22" fmla="*/ 2183667 w 5746492"/>
+              <a:gd name="connsiteY22" fmla="*/ 3782061 h 3782061"/>
+              <a:gd name="connsiteX23" fmla="*/ 1494088 w 5746492"/>
+              <a:gd name="connsiteY23" fmla="*/ 3782061 h 3782061"/>
+              <a:gd name="connsiteX24" fmla="*/ 861974 w 5746492"/>
+              <a:gd name="connsiteY24" fmla="*/ 3782061 h 3782061"/>
+              <a:gd name="connsiteX25" fmla="*/ 0 w 5746492"/>
+              <a:gd name="connsiteY25" fmla="*/ 3782061 h 3782061"/>
+              <a:gd name="connsiteX26" fmla="*/ 0 w 5746492"/>
+              <a:gd name="connsiteY26" fmla="*/ 3241767 h 3782061"/>
+              <a:gd name="connsiteX27" fmla="*/ 0 w 5746492"/>
+              <a:gd name="connsiteY27" fmla="*/ 2814934 h 3782061"/>
+              <a:gd name="connsiteX28" fmla="*/ 0 w 5746492"/>
+              <a:gd name="connsiteY28" fmla="*/ 2274640 h 3782061"/>
+              <a:gd name="connsiteX29" fmla="*/ 0 w 5746492"/>
+              <a:gd name="connsiteY29" fmla="*/ 1658704 h 3782061"/>
+              <a:gd name="connsiteX30" fmla="*/ 0 w 5746492"/>
+              <a:gd name="connsiteY30" fmla="*/ 1118409 h 3782061"/>
+              <a:gd name="connsiteX31" fmla="*/ 0 w 5746492"/>
+              <a:gd name="connsiteY31" fmla="*/ 615936 h 3782061"/>
+              <a:gd name="connsiteX32" fmla="*/ 0 w 5746492"/>
+              <a:gd name="connsiteY32" fmla="*/ 0 h 3782061"/>
+            </a:gdLst>
+            <a:ahLst/>
+            <a:cxnLst>
+              <a:cxn ang="0">
+                <a:pos x="connsiteX0" y="connsiteY0"/>
+              </a:cxn>
+              <a:cxn ang="0">
+                <a:pos x="connsiteX1" y="connsiteY1"/>
+              </a:cxn>
+              <a:cxn ang="0">
+                <a:pos x="connsiteX2" y="connsiteY2"/>
+              </a:cxn>
+              <a:cxn ang="0">
+                <a:pos x="connsiteX3" y="connsiteY3"/>
+              </a:cxn>
+              <a:cxn ang="0">
+                <a:pos x="connsiteX4" y="connsiteY4"/>
+              </a:cxn>
+              <a:cxn ang="0">
+                <a:pos x="connsiteX5" y="connsiteY5"/>
+              </a:cxn>
+              <a:cxn ang="0">
+                <a:pos x="connsiteX6" y="connsiteY6"/>
+              </a:cxn>
+              <a:cxn ang="0">
+                <a:pos x="connsiteX7" y="connsiteY7"/>
+              </a:cxn>
+              <a:cxn ang="0">
+                <a:pos x="connsiteX8" y="connsiteY8"/>
+              </a:cxn>
+              <a:cxn ang="0">
+                <a:pos x="connsiteX9" y="connsiteY9"/>
+              </a:cxn>
+              <a:cxn ang="0">
+                <a:pos x="connsiteX10" y="connsiteY10"/>
+              </a:cxn>
+              <a:cxn ang="0">
+                <a:pos x="connsiteX11" y="connsiteY11"/>
+              </a:cxn>
+              <a:cxn ang="0">
+                <a:pos x="connsiteX12" y="connsiteY12"/>
+              </a:cxn>
+              <a:cxn ang="0">
+                <a:pos x="connsiteX13" y="connsiteY13"/>
+              </a:cxn>
+              <a:cxn ang="0">
+                <a:pos x="connsiteX14" y="connsiteY14"/>
+              </a:cxn>
+              <a:cxn ang="0">
+                <a:pos x="connsiteX15" y="connsiteY15"/>
+              </a:cxn>
+              <a:cxn ang="0">
+                <a:pos x="connsiteX16" y="connsiteY16"/>
+              </a:cxn>
+              <a:cxn ang="0">
+                <a:pos x="connsiteX17" y="connsiteY17"/>
+              </a:cxn>
+              <a:cxn ang="0">
+                <a:pos x="connsiteX18" y="connsiteY18"/>
+              </a:cxn>
+              <a:cxn ang="0">
+                <a:pos x="connsiteX19" y="connsiteY19"/>
+              </a:cxn>
+              <a:cxn ang="0">
+                <a:pos x="connsiteX20" y="connsiteY20"/>
+              </a:cxn>
+              <a:cxn ang="0">
+                <a:pos x="connsiteX21" y="connsiteY21"/>
+              </a:cxn>
+              <a:cxn ang="0">
+                <a:pos x="connsiteX22" y="connsiteY22"/>
+              </a:cxn>
+              <a:cxn ang="0">
+                <a:pos x="connsiteX23" y="connsiteY23"/>
+              </a:cxn>
+              <a:cxn ang="0">
+                <a:pos x="connsiteX24" y="connsiteY24"/>
+              </a:cxn>
+              <a:cxn ang="0">
+                <a:pos x="connsiteX25" y="connsiteY25"/>
+              </a:cxn>
+              <a:cxn ang="0">
+                <a:pos x="connsiteX26" y="connsiteY26"/>
+              </a:cxn>
+              <a:cxn ang="0">
+                <a:pos x="connsiteX27" y="connsiteY27"/>
+              </a:cxn>
+              <a:cxn ang="0">
+                <a:pos x="connsiteX28" y="connsiteY28"/>
+              </a:cxn>
+              <a:cxn ang="0">
+                <a:pos x="connsiteX29" y="connsiteY29"/>
+              </a:cxn>
+              <a:cxn ang="0">
+                <a:pos x="connsiteX30" y="connsiteY30"/>
+              </a:cxn>
+              <a:cxn ang="0">
+                <a:pos x="connsiteX31" y="connsiteY31"/>
+              </a:cxn>
+              <a:cxn ang="0">
+                <a:pos x="connsiteX32" y="connsiteY32"/>
+              </a:cxn>
+            </a:cxnLst>
+            <a:rect l="l" t="t" r="r" b="b"/>
+            <a:pathLst>
+              <a:path w="5746492" h="3782061" fill="none" extrusionOk="0">
+                <a:moveTo>
+                  <a:pt x="0" y="0"/>
+                </a:moveTo>
+                <a:cubicBezTo>
+                  <a:pt x="171910" y="-64751"/>
+                  <a:pt x="545853" y="65483"/>
+                  <a:pt x="689579" y="0"/>
+                </a:cubicBezTo>
+                <a:cubicBezTo>
+                  <a:pt x="833305" y="-65483"/>
+                  <a:pt x="1167201" y="3348"/>
+                  <a:pt x="1321693" y="0"/>
+                </a:cubicBezTo>
+                <a:cubicBezTo>
+                  <a:pt x="1476185" y="-3348"/>
+                  <a:pt x="1693532" y="20838"/>
+                  <a:pt x="1896342" y="0"/>
+                </a:cubicBezTo>
+                <a:cubicBezTo>
+                  <a:pt x="2099152" y="-20838"/>
+                  <a:pt x="2254266" y="10864"/>
+                  <a:pt x="2585921" y="0"/>
+                </a:cubicBezTo>
+                <a:cubicBezTo>
+                  <a:pt x="2917576" y="-10864"/>
+                  <a:pt x="3049853" y="72394"/>
+                  <a:pt x="3275500" y="0"/>
+                </a:cubicBezTo>
+                <a:cubicBezTo>
+                  <a:pt x="3501147" y="-72394"/>
+                  <a:pt x="3674701" y="30808"/>
+                  <a:pt x="3792685" y="0"/>
+                </a:cubicBezTo>
+                <a:cubicBezTo>
+                  <a:pt x="3910670" y="-30808"/>
+                  <a:pt x="4159433" y="47115"/>
+                  <a:pt x="4367334" y="0"/>
+                </a:cubicBezTo>
+                <a:cubicBezTo>
+                  <a:pt x="4575235" y="-47115"/>
+                  <a:pt x="4788548" y="49978"/>
+                  <a:pt x="5056913" y="0"/>
+                </a:cubicBezTo>
+                <a:cubicBezTo>
+                  <a:pt x="5325278" y="-49978"/>
+                  <a:pt x="5482878" y="49459"/>
+                  <a:pt x="5746492" y="0"/>
+                </a:cubicBezTo>
+                <a:cubicBezTo>
+                  <a:pt x="5811377" y="138872"/>
+                  <a:pt x="5739600" y="421517"/>
+                  <a:pt x="5746492" y="615936"/>
+                </a:cubicBezTo>
+                <a:cubicBezTo>
+                  <a:pt x="5753384" y="810355"/>
+                  <a:pt x="5735304" y="928619"/>
+                  <a:pt x="5746492" y="1042768"/>
+                </a:cubicBezTo>
+                <a:cubicBezTo>
+                  <a:pt x="5757680" y="1156917"/>
+                  <a:pt x="5734215" y="1464261"/>
+                  <a:pt x="5746492" y="1658704"/>
+                </a:cubicBezTo>
+                <a:cubicBezTo>
+                  <a:pt x="5758769" y="1853147"/>
+                  <a:pt x="5690863" y="2012104"/>
+                  <a:pt x="5746492" y="2236819"/>
+                </a:cubicBezTo>
+                <a:cubicBezTo>
+                  <a:pt x="5802121" y="2461534"/>
+                  <a:pt x="5721395" y="2637672"/>
+                  <a:pt x="5746492" y="2814934"/>
+                </a:cubicBezTo>
+                <a:cubicBezTo>
+                  <a:pt x="5771589" y="2992196"/>
+                  <a:pt x="5716735" y="3171091"/>
+                  <a:pt x="5746492" y="3317408"/>
+                </a:cubicBezTo>
+                <a:cubicBezTo>
+                  <a:pt x="5776249" y="3463725"/>
+                  <a:pt x="5691781" y="3630336"/>
+                  <a:pt x="5746492" y="3782061"/>
+                </a:cubicBezTo>
+                <a:cubicBezTo>
+                  <a:pt x="5474253" y="3859619"/>
+                  <a:pt x="5309660" y="3716546"/>
+                  <a:pt x="5056913" y="3782061"/>
+                </a:cubicBezTo>
+                <a:cubicBezTo>
+                  <a:pt x="4804166" y="3847576"/>
+                  <a:pt x="4768883" y="3726955"/>
+                  <a:pt x="4597194" y="3782061"/>
+                </a:cubicBezTo>
+                <a:cubicBezTo>
+                  <a:pt x="4425505" y="3837167"/>
+                  <a:pt x="4123797" y="3752901"/>
+                  <a:pt x="3907615" y="3782061"/>
+                </a:cubicBezTo>
+                <a:cubicBezTo>
+                  <a:pt x="3691433" y="3811221"/>
+                  <a:pt x="3565449" y="3762727"/>
+                  <a:pt x="3447895" y="3782061"/>
+                </a:cubicBezTo>
+                <a:cubicBezTo>
+                  <a:pt x="3330341" y="3801395"/>
+                  <a:pt x="3118432" y="3767845"/>
+                  <a:pt x="2873246" y="3782061"/>
+                </a:cubicBezTo>
+                <a:cubicBezTo>
+                  <a:pt x="2628060" y="3796277"/>
+                  <a:pt x="2353074" y="3773040"/>
+                  <a:pt x="2183667" y="3782061"/>
+                </a:cubicBezTo>
+                <a:cubicBezTo>
+                  <a:pt x="2014260" y="3791082"/>
+                  <a:pt x="1649736" y="3751359"/>
+                  <a:pt x="1494088" y="3782061"/>
+                </a:cubicBezTo>
+                <a:cubicBezTo>
+                  <a:pt x="1338440" y="3812763"/>
+                  <a:pt x="1007506" y="3759858"/>
+                  <a:pt x="861974" y="3782061"/>
+                </a:cubicBezTo>
+                <a:cubicBezTo>
+                  <a:pt x="716442" y="3804264"/>
+                  <a:pt x="280617" y="3730128"/>
+                  <a:pt x="0" y="3782061"/>
+                </a:cubicBezTo>
+                <a:cubicBezTo>
+                  <a:pt x="-41501" y="3514664"/>
+                  <a:pt x="42598" y="3353043"/>
+                  <a:pt x="0" y="3241767"/>
+                </a:cubicBezTo>
+                <a:cubicBezTo>
+                  <a:pt x="-42598" y="3130491"/>
+                  <a:pt x="47145" y="2914993"/>
+                  <a:pt x="0" y="2814934"/>
+                </a:cubicBezTo>
+                <a:cubicBezTo>
+                  <a:pt x="-47145" y="2714875"/>
+                  <a:pt x="21533" y="2455880"/>
+                  <a:pt x="0" y="2274640"/>
+                </a:cubicBezTo>
+                <a:cubicBezTo>
+                  <a:pt x="-21533" y="2093400"/>
+                  <a:pt x="58369" y="1964175"/>
+                  <a:pt x="0" y="1658704"/>
+                </a:cubicBezTo>
+                <a:cubicBezTo>
+                  <a:pt x="-58369" y="1353233"/>
+                  <a:pt x="28805" y="1307885"/>
+                  <a:pt x="0" y="1118409"/>
+                </a:cubicBezTo>
+                <a:cubicBezTo>
+                  <a:pt x="-28805" y="928934"/>
+                  <a:pt x="53165" y="728329"/>
+                  <a:pt x="0" y="615936"/>
+                </a:cubicBezTo>
+                <a:cubicBezTo>
+                  <a:pt x="-53165" y="503543"/>
+                  <a:pt x="36050" y="137897"/>
+                  <a:pt x="0" y="0"/>
+                </a:cubicBezTo>
+                <a:close/>
+              </a:path>
+              <a:path w="5746492" h="3782061" stroke="0" extrusionOk="0">
+                <a:moveTo>
+                  <a:pt x="0" y="0"/>
+                </a:moveTo>
+                <a:cubicBezTo>
+                  <a:pt x="148413" y="-29646"/>
+                  <a:pt x="294406" y="27377"/>
+                  <a:pt x="402254" y="0"/>
+                </a:cubicBezTo>
+                <a:cubicBezTo>
+                  <a:pt x="510102" y="-27377"/>
+                  <a:pt x="812433" y="21431"/>
+                  <a:pt x="919439" y="0"/>
+                </a:cubicBezTo>
+                <a:cubicBezTo>
+                  <a:pt x="1026445" y="-21431"/>
+                  <a:pt x="1369496" y="10247"/>
+                  <a:pt x="1551553" y="0"/>
+                </a:cubicBezTo>
+                <a:cubicBezTo>
+                  <a:pt x="1733610" y="-10247"/>
+                  <a:pt x="2053974" y="48833"/>
+                  <a:pt x="2183667" y="0"/>
+                </a:cubicBezTo>
+                <a:cubicBezTo>
+                  <a:pt x="2313360" y="-48833"/>
+                  <a:pt x="2518529" y="25870"/>
+                  <a:pt x="2643386" y="0"/>
+                </a:cubicBezTo>
+                <a:cubicBezTo>
+                  <a:pt x="2768243" y="-25870"/>
+                  <a:pt x="2886256" y="26818"/>
+                  <a:pt x="3045641" y="0"/>
+                </a:cubicBezTo>
+                <a:cubicBezTo>
+                  <a:pt x="3205027" y="-26818"/>
+                  <a:pt x="3478333" y="31349"/>
+                  <a:pt x="3620290" y="0"/>
+                </a:cubicBezTo>
+                <a:cubicBezTo>
+                  <a:pt x="3762247" y="-31349"/>
+                  <a:pt x="4033694" y="21030"/>
+                  <a:pt x="4194939" y="0"/>
+                </a:cubicBezTo>
+                <a:cubicBezTo>
+                  <a:pt x="4356184" y="-21030"/>
+                  <a:pt x="4511351" y="6937"/>
+                  <a:pt x="4827053" y="0"/>
+                </a:cubicBezTo>
+                <a:cubicBezTo>
+                  <a:pt x="5142755" y="-6937"/>
+                  <a:pt x="5064161" y="40664"/>
+                  <a:pt x="5229308" y="0"/>
+                </a:cubicBezTo>
+                <a:cubicBezTo>
+                  <a:pt x="5394455" y="-40664"/>
+                  <a:pt x="5530930" y="20722"/>
+                  <a:pt x="5746492" y="0"/>
+                </a:cubicBezTo>
+                <a:cubicBezTo>
+                  <a:pt x="5752185" y="228322"/>
+                  <a:pt x="5698159" y="321034"/>
+                  <a:pt x="5746492" y="540294"/>
+                </a:cubicBezTo>
+                <a:cubicBezTo>
+                  <a:pt x="5794825" y="759554"/>
+                  <a:pt x="5725593" y="855491"/>
+                  <a:pt x="5746492" y="967127"/>
+                </a:cubicBezTo>
+                <a:cubicBezTo>
+                  <a:pt x="5767391" y="1078763"/>
+                  <a:pt x="5703382" y="1221822"/>
+                  <a:pt x="5746492" y="1393960"/>
+                </a:cubicBezTo>
+                <a:cubicBezTo>
+                  <a:pt x="5789602" y="1566098"/>
+                  <a:pt x="5740675" y="1807767"/>
+                  <a:pt x="5746492" y="1934254"/>
+                </a:cubicBezTo>
+                <a:cubicBezTo>
+                  <a:pt x="5752309" y="2060741"/>
+                  <a:pt x="5719629" y="2288982"/>
+                  <a:pt x="5746492" y="2512369"/>
+                </a:cubicBezTo>
+                <a:cubicBezTo>
+                  <a:pt x="5773355" y="2735756"/>
+                  <a:pt x="5727326" y="2784892"/>
+                  <a:pt x="5746492" y="2977022"/>
+                </a:cubicBezTo>
+                <a:cubicBezTo>
+                  <a:pt x="5765658" y="3169152"/>
+                  <a:pt x="5735084" y="3616024"/>
+                  <a:pt x="5746492" y="3782061"/>
+                </a:cubicBezTo>
+                <a:cubicBezTo>
+                  <a:pt x="5652986" y="3806379"/>
+                  <a:pt x="5448382" y="3750712"/>
+                  <a:pt x="5344238" y="3782061"/>
+                </a:cubicBezTo>
+                <a:cubicBezTo>
+                  <a:pt x="5240094" y="3813410"/>
+                  <a:pt x="5048997" y="3726947"/>
+                  <a:pt x="4884518" y="3782061"/>
+                </a:cubicBezTo>
+                <a:cubicBezTo>
+                  <a:pt x="4720039" y="3837175"/>
+                  <a:pt x="4667660" y="3743518"/>
+                  <a:pt x="4482264" y="3782061"/>
+                </a:cubicBezTo>
+                <a:cubicBezTo>
+                  <a:pt x="4296868" y="3820604"/>
+                  <a:pt x="4028556" y="3740921"/>
+                  <a:pt x="3850150" y="3782061"/>
+                </a:cubicBezTo>
+                <a:cubicBezTo>
+                  <a:pt x="3671744" y="3823201"/>
+                  <a:pt x="3538539" y="3753257"/>
+                  <a:pt x="3275500" y="3782061"/>
+                </a:cubicBezTo>
+                <a:cubicBezTo>
+                  <a:pt x="3012461" y="3810865"/>
+                  <a:pt x="2923682" y="3757129"/>
+                  <a:pt x="2585921" y="3782061"/>
+                </a:cubicBezTo>
+                <a:cubicBezTo>
+                  <a:pt x="2248160" y="3806993"/>
+                  <a:pt x="2189662" y="3773275"/>
+                  <a:pt x="1953807" y="3782061"/>
+                </a:cubicBezTo>
+                <a:cubicBezTo>
+                  <a:pt x="1717952" y="3790847"/>
+                  <a:pt x="1657943" y="3720002"/>
+                  <a:pt x="1379158" y="3782061"/>
+                </a:cubicBezTo>
+                <a:cubicBezTo>
+                  <a:pt x="1100373" y="3844120"/>
+                  <a:pt x="1002003" y="3739620"/>
+                  <a:pt x="689579" y="3782061"/>
+                </a:cubicBezTo>
+                <a:cubicBezTo>
+                  <a:pt x="377155" y="3824502"/>
+                  <a:pt x="194701" y="3730066"/>
+                  <a:pt x="0" y="3782061"/>
+                </a:cubicBezTo>
+                <a:cubicBezTo>
+                  <a:pt x="-39019" y="3676097"/>
+                  <a:pt x="29079" y="3488181"/>
+                  <a:pt x="0" y="3355228"/>
+                </a:cubicBezTo>
+                <a:cubicBezTo>
+                  <a:pt x="-29079" y="3222275"/>
+                  <a:pt x="47977" y="3095029"/>
+                  <a:pt x="0" y="2928396"/>
+                </a:cubicBezTo>
+                <a:cubicBezTo>
+                  <a:pt x="-47977" y="2761763"/>
+                  <a:pt x="32289" y="2616350"/>
+                  <a:pt x="0" y="2501563"/>
+                </a:cubicBezTo>
+                <a:cubicBezTo>
+                  <a:pt x="-32289" y="2386776"/>
+                  <a:pt x="36843" y="2025688"/>
+                  <a:pt x="0" y="1885628"/>
+                </a:cubicBezTo>
+                <a:cubicBezTo>
+                  <a:pt x="-36843" y="1745569"/>
+                  <a:pt x="10699" y="1500618"/>
+                  <a:pt x="0" y="1345333"/>
+                </a:cubicBezTo>
+                <a:cubicBezTo>
+                  <a:pt x="-10699" y="1190049"/>
+                  <a:pt x="65513" y="1026435"/>
+                  <a:pt x="0" y="767218"/>
+                </a:cubicBezTo>
+                <a:cubicBezTo>
+                  <a:pt x="-65513" y="508001"/>
+                  <a:pt x="33732" y="349964"/>
+                  <a:pt x="0" y="0"/>
+                </a:cubicBezTo>
+                <a:close/>
+              </a:path>
+            </a:pathLst>
+          </a:custGeom>
+          <a:ln w="57150">
+            <a:solidFill>
+              <a:schemeClr val="accent5">
+                <a:lumMod val="50000"/>
+              </a:schemeClr>
+            </a:solidFill>
+            <a:extLst>
+              <a:ext uri="{C807C97D-BFC1-408E-A445-0C87EB9F89A2}">
+                <ask:lineSketchStyleProps xmlns:ask="http://schemas.microsoft.com/office/drawing/2018/sketchyshapes" sd="1490146077">
+                  <a:prstGeom prst="rect">
+                    <a:avLst/>
+                  </a:prstGeom>
+                  <ask:type>
+                    <ask:lineSketchScribble/>
+                  </ask:type>
+                </ask:lineSketchStyleProps>
+              </a:ext>
+            </a:extLst>
+          </a:ln>
+        </p:spPr>
+        <p:style>
+          <a:lnRef idx="2">
+            <a:schemeClr val="accent1"/>
+          </a:lnRef>
+          <a:fillRef idx="1">
+            <a:schemeClr val="lt1"/>
+          </a:fillRef>
+          <a:effectRef idx="0">
+            <a:schemeClr val="accent1"/>
+          </a:effectRef>
+          <a:fontRef idx="minor">
+            <a:schemeClr val="dk1"/>
+          </a:fontRef>
+        </p:style>
+        <p:txBody>
+          <a:bodyPr wrap="square">
+            <a:spAutoFit/>
+          </a:bodyPr>
           <a:lstStyle/>
           <a:p>
-            <a:endParaRPr lang="zh-CN" altLang="en-US"/>
+            <a:pPr marL="171450" indent="-171450">
+              <a:lnSpc>
+                <a:spcPct val="150000"/>
+              </a:lnSpc>
+              <a:buFont typeface="Arial" panose="020B0604020202020204" pitchFamily="34" charset="0"/>
+              <a:buChar char="•"/>
+            </a:pPr>
+            <a:r>
+              <a:rPr lang="en-US" altLang="zh-CN" dirty="0">
+                <a:latin typeface="Times New Roman" panose="02020603050405020304" pitchFamily="18" charset="0"/>
+                <a:cs typeface="Times New Roman" panose="02020603050405020304" pitchFamily="18" charset="0"/>
+              </a:rPr>
+              <a:t>In </a:t>
+            </a:r>
+            <a:r>
+              <a:rPr lang="en-US" altLang="zh-CN" b="1" dirty="0">
+                <a:latin typeface="Times New Roman" panose="02020603050405020304" pitchFamily="18" charset="0"/>
+                <a:cs typeface="Times New Roman" panose="02020603050405020304" pitchFamily="18" charset="0"/>
+              </a:rPr>
+              <a:t>section 2</a:t>
+            </a:r>
+            <a:r>
+              <a:rPr lang="en-US" altLang="zh-CN" dirty="0">
+                <a:latin typeface="Times New Roman" panose="02020603050405020304" pitchFamily="18" charset="0"/>
+                <a:cs typeface="Times New Roman" panose="02020603050405020304" pitchFamily="18" charset="0"/>
+              </a:rPr>
+              <a:t>, also introduce common heuristics for every tasks; Draw a table about the relationship between tasks and heuristics, and also mark the property as Latency-Critical or Latency-Tolerant Task. Make common examples for each task.</a:t>
+            </a:r>
+          </a:p>
+          <a:p>
+            <a:pPr marL="171450" indent="-171450">
+              <a:lnSpc>
+                <a:spcPct val="150000"/>
+              </a:lnSpc>
+              <a:buFont typeface="Arial" panose="020B0604020202020204" pitchFamily="34" charset="0"/>
+              <a:buChar char="•"/>
+            </a:pPr>
+            <a:r>
+              <a:rPr lang="en-US" altLang="zh-CN" dirty="0">
+                <a:latin typeface="Times New Roman" panose="02020603050405020304" pitchFamily="18" charset="0"/>
+                <a:cs typeface="Times New Roman" panose="02020603050405020304" pitchFamily="18" charset="0"/>
+              </a:rPr>
+              <a:t>In </a:t>
+            </a:r>
+            <a:r>
+              <a:rPr lang="en-US" altLang="zh-CN" b="1" dirty="0">
+                <a:latin typeface="Times New Roman" panose="02020603050405020304" pitchFamily="18" charset="0"/>
+                <a:cs typeface="Times New Roman" panose="02020603050405020304" pitchFamily="18" charset="0"/>
+              </a:rPr>
+              <a:t>section 3</a:t>
+            </a:r>
+            <a:r>
+              <a:rPr lang="en-US" altLang="zh-CN" dirty="0">
+                <a:latin typeface="Times New Roman" panose="02020603050405020304" pitchFamily="18" charset="0"/>
+                <a:cs typeface="Times New Roman" panose="02020603050405020304" pitchFamily="18" charset="0"/>
+              </a:rPr>
+              <a:t>, for each method in each task, state the ML model, training method, inference location and improvement compared to traditional method (a line in the table).</a:t>
+            </a:r>
           </a:p>
         </p:txBody>
       </p:sp>
     </p:spTree>
     <p:extLst>
       <p:ext uri="{BB962C8B-B14F-4D97-AF65-F5344CB8AC3E}">
-        <p14:creationId xmlns:p14="http://schemas.microsoft.com/office/powerpoint/2010/main" val="2298568569"/>
+        <p14:creationId xmlns:p14="http://schemas.microsoft.com/office/powerpoint/2010/main" val="3863560523"/>
+      </p:ext>
+    </p:extLst>
+  </p:cSld>
+  <p:clrMapOvr>
+    <a:masterClrMapping/>
+  </p:clrMapOvr>
+</p:sld>
+</file>
+
+<file path=ppt/slides/slide3.xml><?xml version="1.0" encoding="utf-8"?>
+<p:sld xmlns:a="http://schemas.openxmlformats.org/drawingml/2006/main" xmlns:r="http://schemas.openxmlformats.org/officeDocument/2006/relationships" xmlns:p="http://schemas.openxmlformats.org/presentationml/2006/main">
+  <p:cSld>
+    <p:spTree>
+      <p:nvGrpSpPr>
+        <p:cNvPr id="1" name=""/>
+        <p:cNvGrpSpPr/>
+        <p:nvPr/>
+      </p:nvGrpSpPr>
+      <p:grpSpPr>
+        <a:xfrm>
+          <a:off x="0" y="0"/>
+          <a:ext cx="0" cy="0"/>
+          <a:chOff x="0" y="0"/>
+          <a:chExt cx="0" cy="0"/>
+        </a:xfrm>
+      </p:grpSpPr>
+      <p:sp>
+        <p:nvSpPr>
+          <p:cNvPr id="2" name="标题 1">
+            <a:extLst>
+              <a:ext uri="{FF2B5EF4-FFF2-40B4-BE49-F238E27FC236}">
+                <a16:creationId xmlns:a16="http://schemas.microsoft.com/office/drawing/2014/main" id="{263F94DF-5FBB-E1CA-1AA5-D7E737768244}"/>
+              </a:ext>
+            </a:extLst>
+          </p:cNvPr>
+          <p:cNvSpPr>
+            <a:spLocks noGrp="1"/>
+          </p:cNvSpPr>
+          <p:nvPr>
+            <p:ph type="title"/>
+          </p:nvPr>
+        </p:nvSpPr>
+        <p:spPr>
+          <a:xfrm>
+            <a:off x="838199" y="229733"/>
+            <a:ext cx="11789229" cy="451304"/>
+          </a:xfrm>
+        </p:spPr>
+        <p:txBody>
+          <a:bodyPr>
+            <a:noAutofit/>
+          </a:bodyPr>
+          <a:lstStyle/>
+          <a:p>
+            <a:r>
+              <a:rPr lang="en-US" altLang="zh-CN" sz="2800" b="1" dirty="0"/>
+              <a:t>I/O Scheduler (Manage a block device’s request queue)</a:t>
+            </a:r>
+            <a:endParaRPr lang="zh-CN" altLang="en-US" sz="2800" b="1" dirty="0"/>
+          </a:p>
+        </p:txBody>
+      </p:sp>
+      <p:sp>
+        <p:nvSpPr>
+          <p:cNvPr id="3" name="内容占位符 2">
+            <a:extLst>
+              <a:ext uri="{FF2B5EF4-FFF2-40B4-BE49-F238E27FC236}">
+                <a16:creationId xmlns:a16="http://schemas.microsoft.com/office/drawing/2014/main" id="{04057202-6AF7-C043-B925-0CA15DC783E5}"/>
+              </a:ext>
+            </a:extLst>
+          </p:cNvPr>
+          <p:cNvSpPr>
+            <a:spLocks noGrp="1"/>
+          </p:cNvSpPr>
+          <p:nvPr>
+            <p:ph idx="1"/>
+          </p:nvPr>
+        </p:nvSpPr>
+        <p:spPr>
+          <a:xfrm>
+            <a:off x="838200" y="859971"/>
+            <a:ext cx="10515600" cy="5316992"/>
+          </a:xfrm>
+        </p:spPr>
+        <p:txBody>
+          <a:bodyPr/>
+          <a:lstStyle/>
+          <a:p>
+            <a:r>
+              <a:rPr lang="en-US" altLang="zh-CN" dirty="0" err="1"/>
+              <a:t>Noop</a:t>
+            </a:r>
+            <a:endParaRPr lang="en-US" altLang="zh-CN" dirty="0"/>
+          </a:p>
+          <a:p>
+            <a:r>
+              <a:rPr lang="en-US" altLang="zh-CN" dirty="0" err="1"/>
+              <a:t>Cfq</a:t>
+            </a:r>
+            <a:endParaRPr lang="en-US" altLang="zh-CN" dirty="0"/>
+          </a:p>
+          <a:p>
+            <a:r>
+              <a:rPr lang="en-US" altLang="zh-CN" dirty="0"/>
+              <a:t>Deadline</a:t>
+            </a:r>
+          </a:p>
+          <a:p>
+            <a:r>
+              <a:rPr lang="en-US" altLang="zh-CN" dirty="0"/>
+              <a:t>Anticipatory</a:t>
+            </a:r>
+          </a:p>
+          <a:p>
+            <a:r>
+              <a:rPr lang="en-US" altLang="zh-CN"/>
+              <a:t>Linus Elevator </a:t>
+            </a:r>
+            <a:endParaRPr lang="zh-CN" altLang="en-US" dirty="0"/>
+          </a:p>
+        </p:txBody>
+      </p:sp>
+    </p:spTree>
+    <p:extLst>
+      <p:ext uri="{BB962C8B-B14F-4D97-AF65-F5344CB8AC3E}">
+        <p14:creationId xmlns:p14="http://schemas.microsoft.com/office/powerpoint/2010/main" val="1683538132"/>
       </p:ext>
     </p:extLst>
   </p:cSld>
@@ -4273,4 +6199,299 @@
     </a:ext>
   </a:extLst>
 </a:theme>
+</file>
+
+<file path=ppt/theme/theme2.xml><?xml version="1.0" encoding="utf-8"?>
+<a:theme xmlns:a="http://schemas.openxmlformats.org/drawingml/2006/main" name="Office 主题​​">
+  <a:themeElements>
+    <a:clrScheme name="Office">
+      <a:dk1>
+        <a:sysClr val="windowText" lastClr="000000"/>
+      </a:dk1>
+      <a:lt1>
+        <a:sysClr val="window" lastClr="FFFFFF"/>
+      </a:lt1>
+      <a:dk2>
+        <a:srgbClr val="44546A"/>
+      </a:dk2>
+      <a:lt2>
+        <a:srgbClr val="E7E6E6"/>
+      </a:lt2>
+      <a:accent1>
+        <a:srgbClr val="4472C4"/>
+      </a:accent1>
+      <a:accent2>
+        <a:srgbClr val="ED7D31"/>
+      </a:accent2>
+      <a:accent3>
+        <a:srgbClr val="A5A5A5"/>
+      </a:accent3>
+      <a:accent4>
+        <a:srgbClr val="FFC000"/>
+      </a:accent4>
+      <a:accent5>
+        <a:srgbClr val="5B9BD5"/>
+      </a:accent5>
+      <a:accent6>
+        <a:srgbClr val="70AD47"/>
+      </a:accent6>
+      <a:hlink>
+        <a:srgbClr val="0563C1"/>
+      </a:hlink>
+      <a:folHlink>
+        <a:srgbClr val="954F72"/>
+      </a:folHlink>
+    </a:clrScheme>
+    <a:fontScheme name="Office">
+      <a:majorFont>
+        <a:latin typeface="等线 Light" panose="020F0302020204030204"/>
+        <a:ea typeface=""/>
+        <a:cs typeface=""/>
+        <a:font script="Jpan" typeface="游ゴシック Light"/>
+        <a:font script="Hang" typeface="맑은 고딕"/>
+        <a:font script="Hans" typeface="等线 Light"/>
+        <a:font script="Hant" typeface="新細明體"/>
+        <a:font script="Arab" typeface="Times New Roman"/>
+        <a:font script="Hebr" typeface="Times New Roman"/>
+        <a:font script="Thai" typeface="Angsana New"/>
+        <a:font script="Ethi" typeface="Nyala"/>
+        <a:font script="Beng" typeface="Vrinda"/>
+        <a:font script="Gujr" typeface="Shruti"/>
+        <a:font script="Khmr" typeface="MoolBoran"/>
+        <a:font script="Knda" typeface="Tunga"/>
+        <a:font script="Guru" typeface="Raavi"/>
+        <a:font script="Cans" typeface="Euphemia"/>
+        <a:font script="Cher" typeface="Plantagenet Cherokee"/>
+        <a:font script="Yiii" typeface="Microsoft Yi Baiti"/>
+        <a:font script="Tibt" typeface="Microsoft Himalaya"/>
+        <a:font script="Thaa" typeface="MV Boli"/>
+        <a:font script="Deva" typeface="Mangal"/>
+        <a:font script="Telu" typeface="Gautami"/>
+        <a:font script="Taml" typeface="Latha"/>
+        <a:font script="Syrc" typeface="Estrangelo Edessa"/>
+        <a:font script="Orya" typeface="Kalinga"/>
+        <a:font script="Mlym" typeface="Kartika"/>
+        <a:font script="Laoo" typeface="DokChampa"/>
+        <a:font script="Sinh" typeface="Iskoola Pota"/>
+        <a:font script="Mong" typeface="Mongolian Baiti"/>
+        <a:font script="Viet" typeface="Times New Roman"/>
+        <a:font script="Uigh" typeface="Microsoft Uighur"/>
+        <a:font script="Geor" typeface="Sylfaen"/>
+        <a:font script="Armn" typeface="Arial"/>
+        <a:font script="Bugi" typeface="Leelawadee UI"/>
+        <a:font script="Bopo" typeface="Microsoft JhengHei"/>
+        <a:font script="Java" typeface="Javanese Text"/>
+        <a:font script="Lisu" typeface="Segoe UI"/>
+        <a:font script="Mymr" typeface="Myanmar Text"/>
+        <a:font script="Nkoo" typeface="Ebrima"/>
+        <a:font script="Olck" typeface="Nirmala UI"/>
+        <a:font script="Osma" typeface="Ebrima"/>
+        <a:font script="Phag" typeface="Phagspa"/>
+        <a:font script="Syrn" typeface="Estrangelo Edessa"/>
+        <a:font script="Syrj" typeface="Estrangelo Edessa"/>
+        <a:font script="Syre" typeface="Estrangelo Edessa"/>
+        <a:font script="Sora" typeface="Nirmala UI"/>
+        <a:font script="Tale" typeface="Microsoft Tai Le"/>
+        <a:font script="Talu" typeface="Microsoft New Tai Lue"/>
+        <a:font script="Tfng" typeface="Ebrima"/>
+      </a:majorFont>
+      <a:minorFont>
+        <a:latin typeface="等线" panose="020F0502020204030204"/>
+        <a:ea typeface=""/>
+        <a:cs typeface=""/>
+        <a:font script="Jpan" typeface="游ゴシック"/>
+        <a:font script="Hang" typeface="맑은 고딕"/>
+        <a:font script="Hans" typeface="等线"/>
+        <a:font script="Hant" typeface="新細明體"/>
+        <a:font script="Arab" typeface="Arial"/>
+        <a:font script="Hebr" typeface="Arial"/>
+        <a:font script="Thai" typeface="Cordia New"/>
+        <a:font script="Ethi" typeface="Nyala"/>
+        <a:font script="Beng" typeface="Vrinda"/>
+        <a:font script="Gujr" typeface="Shruti"/>
+        <a:font script="Khmr" typeface="DaunPenh"/>
+        <a:font script="Knda" typeface="Tunga"/>
+        <a:font script="Guru" typeface="Raavi"/>
+        <a:font script="Cans" typeface="Euphemia"/>
+        <a:font script="Cher" typeface="Plantagenet Cherokee"/>
+        <a:font script="Yiii" typeface="Microsoft Yi Baiti"/>
+        <a:font script="Tibt" typeface="Microsoft Himalaya"/>
+        <a:font script="Thaa" typeface="MV Boli"/>
+        <a:font script="Deva" typeface="Mangal"/>
+        <a:font script="Telu" typeface="Gautami"/>
+        <a:font script="Taml" typeface="Latha"/>
+        <a:font script="Syrc" typeface="Estrangelo Edessa"/>
+        <a:font script="Orya" typeface="Kalinga"/>
+        <a:font script="Mlym" typeface="Kartika"/>
+        <a:font script="Laoo" typeface="DokChampa"/>
+        <a:font script="Sinh" typeface="Iskoola Pota"/>
+        <a:font script="Mong" typeface="Mongolian Baiti"/>
+        <a:font script="Viet" typeface="Arial"/>
+        <a:font script="Uigh" typeface="Microsoft Uighur"/>
+        <a:font script="Geor" typeface="Sylfaen"/>
+        <a:font script="Armn" typeface="Arial"/>
+        <a:font script="Bugi" typeface="Leelawadee UI"/>
+        <a:font script="Bopo" typeface="Microsoft JhengHei"/>
+        <a:font script="Java" typeface="Javanese Text"/>
+        <a:font script="Lisu" typeface="Segoe UI"/>
+        <a:font script="Mymr" typeface="Myanmar Text"/>
+        <a:font script="Nkoo" typeface="Ebrima"/>
+        <a:font script="Olck" typeface="Nirmala UI"/>
+        <a:font script="Osma" typeface="Ebrima"/>
+        <a:font script="Phag" typeface="Phagspa"/>
+        <a:font script="Syrn" typeface="Estrangelo Edessa"/>
+        <a:font script="Syrj" typeface="Estrangelo Edessa"/>
+        <a:font script="Syre" typeface="Estrangelo Edessa"/>
+        <a:font script="Sora" typeface="Nirmala UI"/>
+        <a:font script="Tale" typeface="Microsoft Tai Le"/>
+        <a:font script="Talu" typeface="Microsoft New Tai Lue"/>
+        <a:font script="Tfng" typeface="Ebrima"/>
+      </a:minorFont>
+    </a:fontScheme>
+    <a:fmtScheme name="Office">
+      <a:fillStyleLst>
+        <a:solidFill>
+          <a:schemeClr val="phClr"/>
+        </a:solidFill>
+        <a:gradFill rotWithShape="1">
+          <a:gsLst>
+            <a:gs pos="0">
+              <a:schemeClr val="phClr">
+                <a:lumMod val="110000"/>
+                <a:satMod val="105000"/>
+                <a:tint val="67000"/>
+              </a:schemeClr>
+            </a:gs>
+            <a:gs pos="50000">
+              <a:schemeClr val="phClr">
+                <a:lumMod val="105000"/>
+                <a:satMod val="103000"/>
+                <a:tint val="73000"/>
+              </a:schemeClr>
+            </a:gs>
+            <a:gs pos="100000">
+              <a:schemeClr val="phClr">
+                <a:lumMod val="105000"/>
+                <a:satMod val="109000"/>
+                <a:tint val="81000"/>
+              </a:schemeClr>
+            </a:gs>
+          </a:gsLst>
+          <a:lin ang="5400000" scaled="0"/>
+        </a:gradFill>
+        <a:gradFill rotWithShape="1">
+          <a:gsLst>
+            <a:gs pos="0">
+              <a:schemeClr val="phClr">
+                <a:satMod val="103000"/>
+                <a:lumMod val="102000"/>
+                <a:tint val="94000"/>
+              </a:schemeClr>
+            </a:gs>
+            <a:gs pos="50000">
+              <a:schemeClr val="phClr">
+                <a:satMod val="110000"/>
+                <a:lumMod val="100000"/>
+                <a:shade val="100000"/>
+              </a:schemeClr>
+            </a:gs>
+            <a:gs pos="100000">
+              <a:schemeClr val="phClr">
+                <a:lumMod val="99000"/>
+                <a:satMod val="120000"/>
+                <a:shade val="78000"/>
+              </a:schemeClr>
+            </a:gs>
+          </a:gsLst>
+          <a:lin ang="5400000" scaled="0"/>
+        </a:gradFill>
+      </a:fillStyleLst>
+      <a:lnStyleLst>
+        <a:ln w="6350" cap="flat" cmpd="sng" algn="ctr">
+          <a:solidFill>
+            <a:schemeClr val="phClr"/>
+          </a:solidFill>
+          <a:prstDash val="solid"/>
+          <a:miter lim="800000"/>
+        </a:ln>
+        <a:ln w="12700" cap="flat" cmpd="sng" algn="ctr">
+          <a:solidFill>
+            <a:schemeClr val="phClr"/>
+          </a:solidFill>
+          <a:prstDash val="solid"/>
+          <a:miter lim="800000"/>
+        </a:ln>
+        <a:ln w="19050" cap="flat" cmpd="sng" algn="ctr">
+          <a:solidFill>
+            <a:schemeClr val="phClr"/>
+          </a:solidFill>
+          <a:prstDash val="solid"/>
+          <a:miter lim="800000"/>
+        </a:ln>
+      </a:lnStyleLst>
+      <a:effectStyleLst>
+        <a:effectStyle>
+          <a:effectLst/>
+        </a:effectStyle>
+        <a:effectStyle>
+          <a:effectLst/>
+        </a:effectStyle>
+        <a:effectStyle>
+          <a:effectLst>
+            <a:outerShdw blurRad="57150" dist="19050" dir="5400000" algn="ctr" rotWithShape="0">
+              <a:srgbClr val="000000">
+                <a:alpha val="63000"/>
+              </a:srgbClr>
+            </a:outerShdw>
+          </a:effectLst>
+        </a:effectStyle>
+      </a:effectStyleLst>
+      <a:bgFillStyleLst>
+        <a:solidFill>
+          <a:schemeClr val="phClr"/>
+        </a:solidFill>
+        <a:solidFill>
+          <a:schemeClr val="phClr">
+            <a:tint val="95000"/>
+            <a:satMod val="170000"/>
+          </a:schemeClr>
+        </a:solidFill>
+        <a:gradFill rotWithShape="1">
+          <a:gsLst>
+            <a:gs pos="0">
+              <a:schemeClr val="phClr">
+                <a:tint val="93000"/>
+                <a:satMod val="150000"/>
+                <a:shade val="98000"/>
+                <a:lumMod val="102000"/>
+              </a:schemeClr>
+            </a:gs>
+            <a:gs pos="50000">
+              <a:schemeClr val="phClr">
+                <a:tint val="98000"/>
+                <a:satMod val="130000"/>
+                <a:shade val="90000"/>
+                <a:lumMod val="103000"/>
+              </a:schemeClr>
+            </a:gs>
+            <a:gs pos="100000">
+              <a:schemeClr val="phClr">
+                <a:shade val="63000"/>
+                <a:satMod val="120000"/>
+              </a:schemeClr>
+            </a:gs>
+          </a:gsLst>
+          <a:lin ang="5400000" scaled="0"/>
+        </a:gradFill>
+      </a:bgFillStyleLst>
+    </a:fmtScheme>
+  </a:themeElements>
+  <a:objectDefaults/>
+  <a:extraClrSchemeLst/>
+  <a:extLst>
+    <a:ext uri="{05A4C25C-085E-4340-85A3-A5531E510DB2}">
+      <thm15:themeFamily xmlns:thm15="http://schemas.microsoft.com/office/thememl/2012/main" name="Office Theme" id="{62F939B6-93AF-4DB8-9C6B-D6C7DFDC589F}" vid="{4A3C46E8-61CC-4603-A589-7422A47A8E4A}"/>
+    </a:ext>
+  </a:extLst>
+</a:theme>
 </file>
</xml_diff>